<commit_message>
Added color to the abv and ibu barcharts.
</commit_message>
<xml_diff>
--- a/Case_Study1 JHorvath update.pptx
+++ b/Case_Study1 JHorvath update.pptx
@@ -141,6 +141,22 @@
       </a:defRPr>
     </a:lvl9pPr>
   </p:defaultTextStyle>
+  <p:extLst>
+    <p:ext uri="{EFAFB233-063F-42B5-8137-9DF3F51BA10A}">
+      <p15:sldGuideLst xmlns:p15="http://schemas.microsoft.com/office/powerpoint/2012/main">
+        <p15:guide id="1" orient="horz" pos="2160">
+          <p15:clr>
+            <a:srgbClr val="A4A3A4"/>
+          </p15:clr>
+        </p15:guide>
+        <p15:guide id="2" pos="2880">
+          <p15:clr>
+            <a:srgbClr val="A4A3A4"/>
+          </p15:clr>
+        </p15:guide>
+      </p15:sldGuideLst>
+    </p:ext>
+  </p:extLst>
 </p:presentation>
 </file>
 
@@ -166,7 +182,7 @@
           <p:cNvPr id="2" name="Title 1">
             <a:extLst>
               <a:ext uri="{FF2B5EF4-FFF2-40B4-BE49-F238E27FC236}">
-                <a16:creationId xmlns:a16="http://schemas.microsoft.com/office/drawing/2014/main" xmlns="" id="{53388D85-DC1F-7A47-9377-65E488DEC740}"/>
+                <a16:creationId xmlns:a16="http://schemas.microsoft.com/office/drawing/2014/main" id="{53388D85-DC1F-7A47-9377-65E488DEC740}"/>
               </a:ext>
             </a:extLst>
           </p:cNvPr>
@@ -203,7 +219,7 @@
           <p:cNvPr id="3" name="Subtitle 2">
             <a:extLst>
               <a:ext uri="{FF2B5EF4-FFF2-40B4-BE49-F238E27FC236}">
-                <a16:creationId xmlns:a16="http://schemas.microsoft.com/office/drawing/2014/main" xmlns="" id="{AA5215A6-C086-1F4E-A51A-E03C9077A99E}"/>
+                <a16:creationId xmlns:a16="http://schemas.microsoft.com/office/drawing/2014/main" id="{AA5215A6-C086-1F4E-A51A-E03C9077A99E}"/>
               </a:ext>
             </a:extLst>
           </p:cNvPr>
@@ -273,7 +289,7 @@
           <p:cNvPr id="4" name="Rectangle 4">
             <a:extLst>
               <a:ext uri="{FF2B5EF4-FFF2-40B4-BE49-F238E27FC236}">
-                <a16:creationId xmlns:a16="http://schemas.microsoft.com/office/drawing/2014/main" xmlns="" id="{4CE15B5C-EBA8-4248-8B0E-0114C5351BF4}"/>
+                <a16:creationId xmlns:a16="http://schemas.microsoft.com/office/drawing/2014/main" id="{4CE15B5C-EBA8-4248-8B0E-0114C5351BF4}"/>
               </a:ext>
             </a:extLst>
           </p:cNvPr>
@@ -307,7 +323,7 @@
           <p:cNvPr id="5" name="Rectangle 5">
             <a:extLst>
               <a:ext uri="{FF2B5EF4-FFF2-40B4-BE49-F238E27FC236}">
-                <a16:creationId xmlns:a16="http://schemas.microsoft.com/office/drawing/2014/main" xmlns="" id="{63AA9F56-1F84-A545-BE3C-B025E321EB4D}"/>
+                <a16:creationId xmlns:a16="http://schemas.microsoft.com/office/drawing/2014/main" id="{63AA9F56-1F84-A545-BE3C-B025E321EB4D}"/>
               </a:ext>
             </a:extLst>
           </p:cNvPr>
@@ -341,7 +357,7 @@
           <p:cNvPr id="6" name="Rectangle 6">
             <a:extLst>
               <a:ext uri="{FF2B5EF4-FFF2-40B4-BE49-F238E27FC236}">
-                <a16:creationId xmlns:a16="http://schemas.microsoft.com/office/drawing/2014/main" xmlns="" id="{7B75B442-28E5-D247-8FA7-230A01F93BAC}"/>
+                <a16:creationId xmlns:a16="http://schemas.microsoft.com/office/drawing/2014/main" id="{7B75B442-28E5-D247-8FA7-230A01F93BAC}"/>
               </a:ext>
             </a:extLst>
           </p:cNvPr>
@@ -402,7 +418,7 @@
           <p:cNvPr id="2" name="Title 1">
             <a:extLst>
               <a:ext uri="{FF2B5EF4-FFF2-40B4-BE49-F238E27FC236}">
-                <a16:creationId xmlns:a16="http://schemas.microsoft.com/office/drawing/2014/main" xmlns="" id="{AB1CCAEC-6C43-964F-919A-07332415BA2A}"/>
+                <a16:creationId xmlns:a16="http://schemas.microsoft.com/office/drawing/2014/main" id="{AB1CCAEC-6C43-964F-919A-07332415BA2A}"/>
               </a:ext>
             </a:extLst>
           </p:cNvPr>
@@ -430,7 +446,7 @@
           <p:cNvPr id="3" name="Vertical Text Placeholder 2">
             <a:extLst>
               <a:ext uri="{FF2B5EF4-FFF2-40B4-BE49-F238E27FC236}">
-                <a16:creationId xmlns:a16="http://schemas.microsoft.com/office/drawing/2014/main" xmlns="" id="{BAEC28DF-FD80-9C4B-ACB2-C3C4A6F3C10A}"/>
+                <a16:creationId xmlns:a16="http://schemas.microsoft.com/office/drawing/2014/main" id="{BAEC28DF-FD80-9C4B-ACB2-C3C4A6F3C10A}"/>
               </a:ext>
             </a:extLst>
           </p:cNvPr>
@@ -487,7 +503,7 @@
           <p:cNvPr id="4" name="Rectangle 4">
             <a:extLst>
               <a:ext uri="{FF2B5EF4-FFF2-40B4-BE49-F238E27FC236}">
-                <a16:creationId xmlns:a16="http://schemas.microsoft.com/office/drawing/2014/main" xmlns="" id="{4CE15B5C-EBA8-4248-8B0E-0114C5351BF4}"/>
+                <a16:creationId xmlns:a16="http://schemas.microsoft.com/office/drawing/2014/main" id="{4CE15B5C-EBA8-4248-8B0E-0114C5351BF4}"/>
               </a:ext>
             </a:extLst>
           </p:cNvPr>
@@ -521,7 +537,7 @@
           <p:cNvPr id="5" name="Rectangle 5">
             <a:extLst>
               <a:ext uri="{FF2B5EF4-FFF2-40B4-BE49-F238E27FC236}">
-                <a16:creationId xmlns:a16="http://schemas.microsoft.com/office/drawing/2014/main" xmlns="" id="{63AA9F56-1F84-A545-BE3C-B025E321EB4D}"/>
+                <a16:creationId xmlns:a16="http://schemas.microsoft.com/office/drawing/2014/main" id="{63AA9F56-1F84-A545-BE3C-B025E321EB4D}"/>
               </a:ext>
             </a:extLst>
           </p:cNvPr>
@@ -555,7 +571,7 @@
           <p:cNvPr id="6" name="Rectangle 6">
             <a:extLst>
               <a:ext uri="{FF2B5EF4-FFF2-40B4-BE49-F238E27FC236}">
-                <a16:creationId xmlns:a16="http://schemas.microsoft.com/office/drawing/2014/main" xmlns="" id="{7B75B442-28E5-D247-8FA7-230A01F93BAC}"/>
+                <a16:creationId xmlns:a16="http://schemas.microsoft.com/office/drawing/2014/main" id="{7B75B442-28E5-D247-8FA7-230A01F93BAC}"/>
               </a:ext>
             </a:extLst>
           </p:cNvPr>
@@ -616,7 +632,7 @@
           <p:cNvPr id="2" name="Vertical Title 1">
             <a:extLst>
               <a:ext uri="{FF2B5EF4-FFF2-40B4-BE49-F238E27FC236}">
-                <a16:creationId xmlns:a16="http://schemas.microsoft.com/office/drawing/2014/main" xmlns="" id="{8354E973-3EC0-EF4A-A07D-614BEAB37BC1}"/>
+                <a16:creationId xmlns:a16="http://schemas.microsoft.com/office/drawing/2014/main" id="{8354E973-3EC0-EF4A-A07D-614BEAB37BC1}"/>
               </a:ext>
             </a:extLst>
           </p:cNvPr>
@@ -649,7 +665,7 @@
           <p:cNvPr id="3" name="Vertical Text Placeholder 2">
             <a:extLst>
               <a:ext uri="{FF2B5EF4-FFF2-40B4-BE49-F238E27FC236}">
-                <a16:creationId xmlns:a16="http://schemas.microsoft.com/office/drawing/2014/main" xmlns="" id="{2009363D-3E80-384B-AC19-D563BC5540C2}"/>
+                <a16:creationId xmlns:a16="http://schemas.microsoft.com/office/drawing/2014/main" id="{2009363D-3E80-384B-AC19-D563BC5540C2}"/>
               </a:ext>
             </a:extLst>
           </p:cNvPr>
@@ -711,7 +727,7 @@
           <p:cNvPr id="4" name="Rectangle 4">
             <a:extLst>
               <a:ext uri="{FF2B5EF4-FFF2-40B4-BE49-F238E27FC236}">
-                <a16:creationId xmlns:a16="http://schemas.microsoft.com/office/drawing/2014/main" xmlns="" id="{4CE15B5C-EBA8-4248-8B0E-0114C5351BF4}"/>
+                <a16:creationId xmlns:a16="http://schemas.microsoft.com/office/drawing/2014/main" id="{4CE15B5C-EBA8-4248-8B0E-0114C5351BF4}"/>
               </a:ext>
             </a:extLst>
           </p:cNvPr>
@@ -745,7 +761,7 @@
           <p:cNvPr id="5" name="Rectangle 5">
             <a:extLst>
               <a:ext uri="{FF2B5EF4-FFF2-40B4-BE49-F238E27FC236}">
-                <a16:creationId xmlns:a16="http://schemas.microsoft.com/office/drawing/2014/main" xmlns="" id="{63AA9F56-1F84-A545-BE3C-B025E321EB4D}"/>
+                <a16:creationId xmlns:a16="http://schemas.microsoft.com/office/drawing/2014/main" id="{63AA9F56-1F84-A545-BE3C-B025E321EB4D}"/>
               </a:ext>
             </a:extLst>
           </p:cNvPr>
@@ -779,7 +795,7 @@
           <p:cNvPr id="6" name="Rectangle 6">
             <a:extLst>
               <a:ext uri="{FF2B5EF4-FFF2-40B4-BE49-F238E27FC236}">
-                <a16:creationId xmlns:a16="http://schemas.microsoft.com/office/drawing/2014/main" xmlns="" id="{7B75B442-28E5-D247-8FA7-230A01F93BAC}"/>
+                <a16:creationId xmlns:a16="http://schemas.microsoft.com/office/drawing/2014/main" id="{7B75B442-28E5-D247-8FA7-230A01F93BAC}"/>
               </a:ext>
             </a:extLst>
           </p:cNvPr>
@@ -840,7 +856,7 @@
           <p:cNvPr id="2" name="Title 1">
             <a:extLst>
               <a:ext uri="{FF2B5EF4-FFF2-40B4-BE49-F238E27FC236}">
-                <a16:creationId xmlns:a16="http://schemas.microsoft.com/office/drawing/2014/main" xmlns="" id="{D8BF8E20-70BB-CE40-97C7-02CD9D96DF86}"/>
+                <a16:creationId xmlns:a16="http://schemas.microsoft.com/office/drawing/2014/main" id="{D8BF8E20-70BB-CE40-97C7-02CD9D96DF86}"/>
               </a:ext>
             </a:extLst>
           </p:cNvPr>
@@ -868,7 +884,7 @@
           <p:cNvPr id="3" name="Content Placeholder 2">
             <a:extLst>
               <a:ext uri="{FF2B5EF4-FFF2-40B4-BE49-F238E27FC236}">
-                <a16:creationId xmlns:a16="http://schemas.microsoft.com/office/drawing/2014/main" xmlns="" id="{256155C0-3633-AA48-B5B9-574C28DCE45C}"/>
+                <a16:creationId xmlns:a16="http://schemas.microsoft.com/office/drawing/2014/main" id="{256155C0-3633-AA48-B5B9-574C28DCE45C}"/>
               </a:ext>
             </a:extLst>
           </p:cNvPr>
@@ -925,7 +941,7 @@
           <p:cNvPr id="4" name="Rectangle 4">
             <a:extLst>
               <a:ext uri="{FF2B5EF4-FFF2-40B4-BE49-F238E27FC236}">
-                <a16:creationId xmlns:a16="http://schemas.microsoft.com/office/drawing/2014/main" xmlns="" id="{4CE15B5C-EBA8-4248-8B0E-0114C5351BF4}"/>
+                <a16:creationId xmlns:a16="http://schemas.microsoft.com/office/drawing/2014/main" id="{4CE15B5C-EBA8-4248-8B0E-0114C5351BF4}"/>
               </a:ext>
             </a:extLst>
           </p:cNvPr>
@@ -959,7 +975,7 @@
           <p:cNvPr id="5" name="Rectangle 5">
             <a:extLst>
               <a:ext uri="{FF2B5EF4-FFF2-40B4-BE49-F238E27FC236}">
-                <a16:creationId xmlns:a16="http://schemas.microsoft.com/office/drawing/2014/main" xmlns="" id="{63AA9F56-1F84-A545-BE3C-B025E321EB4D}"/>
+                <a16:creationId xmlns:a16="http://schemas.microsoft.com/office/drawing/2014/main" id="{63AA9F56-1F84-A545-BE3C-B025E321EB4D}"/>
               </a:ext>
             </a:extLst>
           </p:cNvPr>
@@ -993,7 +1009,7 @@
           <p:cNvPr id="6" name="Rectangle 6">
             <a:extLst>
               <a:ext uri="{FF2B5EF4-FFF2-40B4-BE49-F238E27FC236}">
-                <a16:creationId xmlns:a16="http://schemas.microsoft.com/office/drawing/2014/main" xmlns="" id="{7B75B442-28E5-D247-8FA7-230A01F93BAC}"/>
+                <a16:creationId xmlns:a16="http://schemas.microsoft.com/office/drawing/2014/main" id="{7B75B442-28E5-D247-8FA7-230A01F93BAC}"/>
               </a:ext>
             </a:extLst>
           </p:cNvPr>
@@ -1054,7 +1070,7 @@
           <p:cNvPr id="2" name="Title 1">
             <a:extLst>
               <a:ext uri="{FF2B5EF4-FFF2-40B4-BE49-F238E27FC236}">
-                <a16:creationId xmlns:a16="http://schemas.microsoft.com/office/drawing/2014/main" xmlns="" id="{B56C767E-9916-A541-BEAC-D26C06CEBC6C}"/>
+                <a16:creationId xmlns:a16="http://schemas.microsoft.com/office/drawing/2014/main" id="{B56C767E-9916-A541-BEAC-D26C06CEBC6C}"/>
               </a:ext>
             </a:extLst>
           </p:cNvPr>
@@ -1091,7 +1107,7 @@
           <p:cNvPr id="3" name="Text Placeholder 2">
             <a:extLst>
               <a:ext uri="{FF2B5EF4-FFF2-40B4-BE49-F238E27FC236}">
-                <a16:creationId xmlns:a16="http://schemas.microsoft.com/office/drawing/2014/main" xmlns="" id="{374F2B50-44C8-CA46-AABC-0DED7596250F}"/>
+                <a16:creationId xmlns:a16="http://schemas.microsoft.com/office/drawing/2014/main" id="{374F2B50-44C8-CA46-AABC-0DED7596250F}"/>
               </a:ext>
             </a:extLst>
           </p:cNvPr>
@@ -1162,7 +1178,7 @@
           <p:cNvPr id="4" name="Rectangle 4">
             <a:extLst>
               <a:ext uri="{FF2B5EF4-FFF2-40B4-BE49-F238E27FC236}">
-                <a16:creationId xmlns:a16="http://schemas.microsoft.com/office/drawing/2014/main" xmlns="" id="{4CE15B5C-EBA8-4248-8B0E-0114C5351BF4}"/>
+                <a16:creationId xmlns:a16="http://schemas.microsoft.com/office/drawing/2014/main" id="{4CE15B5C-EBA8-4248-8B0E-0114C5351BF4}"/>
               </a:ext>
             </a:extLst>
           </p:cNvPr>
@@ -1196,7 +1212,7 @@
           <p:cNvPr id="5" name="Rectangle 5">
             <a:extLst>
               <a:ext uri="{FF2B5EF4-FFF2-40B4-BE49-F238E27FC236}">
-                <a16:creationId xmlns:a16="http://schemas.microsoft.com/office/drawing/2014/main" xmlns="" id="{63AA9F56-1F84-A545-BE3C-B025E321EB4D}"/>
+                <a16:creationId xmlns:a16="http://schemas.microsoft.com/office/drawing/2014/main" id="{63AA9F56-1F84-A545-BE3C-B025E321EB4D}"/>
               </a:ext>
             </a:extLst>
           </p:cNvPr>
@@ -1230,7 +1246,7 @@
           <p:cNvPr id="6" name="Rectangle 6">
             <a:extLst>
               <a:ext uri="{FF2B5EF4-FFF2-40B4-BE49-F238E27FC236}">
-                <a16:creationId xmlns:a16="http://schemas.microsoft.com/office/drawing/2014/main" xmlns="" id="{7B75B442-28E5-D247-8FA7-230A01F93BAC}"/>
+                <a16:creationId xmlns:a16="http://schemas.microsoft.com/office/drawing/2014/main" id="{7B75B442-28E5-D247-8FA7-230A01F93BAC}"/>
               </a:ext>
             </a:extLst>
           </p:cNvPr>
@@ -1291,7 +1307,7 @@
           <p:cNvPr id="2" name="Title 1">
             <a:extLst>
               <a:ext uri="{FF2B5EF4-FFF2-40B4-BE49-F238E27FC236}">
-                <a16:creationId xmlns:a16="http://schemas.microsoft.com/office/drawing/2014/main" xmlns="" id="{D483B1F6-C16D-2E48-A07F-8A26F228D07D}"/>
+                <a16:creationId xmlns:a16="http://schemas.microsoft.com/office/drawing/2014/main" id="{D483B1F6-C16D-2E48-A07F-8A26F228D07D}"/>
               </a:ext>
             </a:extLst>
           </p:cNvPr>
@@ -1319,7 +1335,7 @@
           <p:cNvPr id="3" name="Content Placeholder 2">
             <a:extLst>
               <a:ext uri="{FF2B5EF4-FFF2-40B4-BE49-F238E27FC236}">
-                <a16:creationId xmlns:a16="http://schemas.microsoft.com/office/drawing/2014/main" xmlns="" id="{6E796680-5966-F843-B82A-390CA66682C7}"/>
+                <a16:creationId xmlns:a16="http://schemas.microsoft.com/office/drawing/2014/main" id="{6E796680-5966-F843-B82A-390CA66682C7}"/>
               </a:ext>
             </a:extLst>
           </p:cNvPr>
@@ -1381,7 +1397,7 @@
           <p:cNvPr id="4" name="Content Placeholder 3">
             <a:extLst>
               <a:ext uri="{FF2B5EF4-FFF2-40B4-BE49-F238E27FC236}">
-                <a16:creationId xmlns:a16="http://schemas.microsoft.com/office/drawing/2014/main" xmlns="" id="{05311267-F390-3F4E-BD0F-93B009FA3B7F}"/>
+                <a16:creationId xmlns:a16="http://schemas.microsoft.com/office/drawing/2014/main" id="{05311267-F390-3F4E-BD0F-93B009FA3B7F}"/>
               </a:ext>
             </a:extLst>
           </p:cNvPr>
@@ -1443,7 +1459,7 @@
           <p:cNvPr id="5" name="Rectangle 4">
             <a:extLst>
               <a:ext uri="{FF2B5EF4-FFF2-40B4-BE49-F238E27FC236}">
-                <a16:creationId xmlns:a16="http://schemas.microsoft.com/office/drawing/2014/main" xmlns="" id="{4CE15B5C-EBA8-4248-8B0E-0114C5351BF4}"/>
+                <a16:creationId xmlns:a16="http://schemas.microsoft.com/office/drawing/2014/main" id="{4CE15B5C-EBA8-4248-8B0E-0114C5351BF4}"/>
               </a:ext>
             </a:extLst>
           </p:cNvPr>
@@ -1477,7 +1493,7 @@
           <p:cNvPr id="6" name="Rectangle 5">
             <a:extLst>
               <a:ext uri="{FF2B5EF4-FFF2-40B4-BE49-F238E27FC236}">
-                <a16:creationId xmlns:a16="http://schemas.microsoft.com/office/drawing/2014/main" xmlns="" id="{63AA9F56-1F84-A545-BE3C-B025E321EB4D}"/>
+                <a16:creationId xmlns:a16="http://schemas.microsoft.com/office/drawing/2014/main" id="{63AA9F56-1F84-A545-BE3C-B025E321EB4D}"/>
               </a:ext>
             </a:extLst>
           </p:cNvPr>
@@ -1511,7 +1527,7 @@
           <p:cNvPr id="7" name="Rectangle 6">
             <a:extLst>
               <a:ext uri="{FF2B5EF4-FFF2-40B4-BE49-F238E27FC236}">
-                <a16:creationId xmlns:a16="http://schemas.microsoft.com/office/drawing/2014/main" xmlns="" id="{7B75B442-28E5-D247-8FA7-230A01F93BAC}"/>
+                <a16:creationId xmlns:a16="http://schemas.microsoft.com/office/drawing/2014/main" id="{7B75B442-28E5-D247-8FA7-230A01F93BAC}"/>
               </a:ext>
             </a:extLst>
           </p:cNvPr>
@@ -1572,7 +1588,7 @@
           <p:cNvPr id="2" name="Title 1">
             <a:extLst>
               <a:ext uri="{FF2B5EF4-FFF2-40B4-BE49-F238E27FC236}">
-                <a16:creationId xmlns:a16="http://schemas.microsoft.com/office/drawing/2014/main" xmlns="" id="{49B769AE-C9D8-B546-941B-BC554F01FF68}"/>
+                <a16:creationId xmlns:a16="http://schemas.microsoft.com/office/drawing/2014/main" id="{49B769AE-C9D8-B546-941B-BC554F01FF68}"/>
               </a:ext>
             </a:extLst>
           </p:cNvPr>
@@ -1605,7 +1621,7 @@
           <p:cNvPr id="3" name="Text Placeholder 2">
             <a:extLst>
               <a:ext uri="{FF2B5EF4-FFF2-40B4-BE49-F238E27FC236}">
-                <a16:creationId xmlns:a16="http://schemas.microsoft.com/office/drawing/2014/main" xmlns="" id="{A316B1CB-8BE9-D749-8985-31F29504DBB6}"/>
+                <a16:creationId xmlns:a16="http://schemas.microsoft.com/office/drawing/2014/main" id="{A316B1CB-8BE9-D749-8985-31F29504DBB6}"/>
               </a:ext>
             </a:extLst>
           </p:cNvPr>
@@ -1676,7 +1692,7 @@
           <p:cNvPr id="4" name="Content Placeholder 3">
             <a:extLst>
               <a:ext uri="{FF2B5EF4-FFF2-40B4-BE49-F238E27FC236}">
-                <a16:creationId xmlns:a16="http://schemas.microsoft.com/office/drawing/2014/main" xmlns="" id="{0A02D967-6C98-F24E-843E-B5C8C2D00F81}"/>
+                <a16:creationId xmlns:a16="http://schemas.microsoft.com/office/drawing/2014/main" id="{0A02D967-6C98-F24E-843E-B5C8C2D00F81}"/>
               </a:ext>
             </a:extLst>
           </p:cNvPr>
@@ -1738,7 +1754,7 @@
           <p:cNvPr id="5" name="Text Placeholder 4">
             <a:extLst>
               <a:ext uri="{FF2B5EF4-FFF2-40B4-BE49-F238E27FC236}">
-                <a16:creationId xmlns:a16="http://schemas.microsoft.com/office/drawing/2014/main" xmlns="" id="{A72E16C0-85B5-B146-86B5-1034FB458E05}"/>
+                <a16:creationId xmlns:a16="http://schemas.microsoft.com/office/drawing/2014/main" id="{A72E16C0-85B5-B146-86B5-1034FB458E05}"/>
               </a:ext>
             </a:extLst>
           </p:cNvPr>
@@ -1809,7 +1825,7 @@
           <p:cNvPr id="6" name="Content Placeholder 5">
             <a:extLst>
               <a:ext uri="{FF2B5EF4-FFF2-40B4-BE49-F238E27FC236}">
-                <a16:creationId xmlns:a16="http://schemas.microsoft.com/office/drawing/2014/main" xmlns="" id="{E18BE306-AFB3-A74E-B6FD-3017F4489F24}"/>
+                <a16:creationId xmlns:a16="http://schemas.microsoft.com/office/drawing/2014/main" id="{E18BE306-AFB3-A74E-B6FD-3017F4489F24}"/>
               </a:ext>
             </a:extLst>
           </p:cNvPr>
@@ -1871,7 +1887,7 @@
           <p:cNvPr id="7" name="Rectangle 4">
             <a:extLst>
               <a:ext uri="{FF2B5EF4-FFF2-40B4-BE49-F238E27FC236}">
-                <a16:creationId xmlns:a16="http://schemas.microsoft.com/office/drawing/2014/main" xmlns="" id="{4CE15B5C-EBA8-4248-8B0E-0114C5351BF4}"/>
+                <a16:creationId xmlns:a16="http://schemas.microsoft.com/office/drawing/2014/main" id="{4CE15B5C-EBA8-4248-8B0E-0114C5351BF4}"/>
               </a:ext>
             </a:extLst>
           </p:cNvPr>
@@ -1905,7 +1921,7 @@
           <p:cNvPr id="8" name="Rectangle 5">
             <a:extLst>
               <a:ext uri="{FF2B5EF4-FFF2-40B4-BE49-F238E27FC236}">
-                <a16:creationId xmlns:a16="http://schemas.microsoft.com/office/drawing/2014/main" xmlns="" id="{63AA9F56-1F84-A545-BE3C-B025E321EB4D}"/>
+                <a16:creationId xmlns:a16="http://schemas.microsoft.com/office/drawing/2014/main" id="{63AA9F56-1F84-A545-BE3C-B025E321EB4D}"/>
               </a:ext>
             </a:extLst>
           </p:cNvPr>
@@ -1939,7 +1955,7 @@
           <p:cNvPr id="9" name="Rectangle 6">
             <a:extLst>
               <a:ext uri="{FF2B5EF4-FFF2-40B4-BE49-F238E27FC236}">
-                <a16:creationId xmlns:a16="http://schemas.microsoft.com/office/drawing/2014/main" xmlns="" id="{7B75B442-28E5-D247-8FA7-230A01F93BAC}"/>
+                <a16:creationId xmlns:a16="http://schemas.microsoft.com/office/drawing/2014/main" id="{7B75B442-28E5-D247-8FA7-230A01F93BAC}"/>
               </a:ext>
             </a:extLst>
           </p:cNvPr>
@@ -2000,7 +2016,7 @@
           <p:cNvPr id="2" name="Title 1">
             <a:extLst>
               <a:ext uri="{FF2B5EF4-FFF2-40B4-BE49-F238E27FC236}">
-                <a16:creationId xmlns:a16="http://schemas.microsoft.com/office/drawing/2014/main" xmlns="" id="{7BBE50BD-C5E8-7C4D-9CC3-D26F92409F61}"/>
+                <a16:creationId xmlns:a16="http://schemas.microsoft.com/office/drawing/2014/main" id="{7BBE50BD-C5E8-7C4D-9CC3-D26F92409F61}"/>
               </a:ext>
             </a:extLst>
           </p:cNvPr>
@@ -2028,7 +2044,7 @@
           <p:cNvPr id="3" name="Rectangle 4">
             <a:extLst>
               <a:ext uri="{FF2B5EF4-FFF2-40B4-BE49-F238E27FC236}">
-                <a16:creationId xmlns:a16="http://schemas.microsoft.com/office/drawing/2014/main" xmlns="" id="{4CE15B5C-EBA8-4248-8B0E-0114C5351BF4}"/>
+                <a16:creationId xmlns:a16="http://schemas.microsoft.com/office/drawing/2014/main" id="{4CE15B5C-EBA8-4248-8B0E-0114C5351BF4}"/>
               </a:ext>
             </a:extLst>
           </p:cNvPr>
@@ -2062,7 +2078,7 @@
           <p:cNvPr id="4" name="Rectangle 5">
             <a:extLst>
               <a:ext uri="{FF2B5EF4-FFF2-40B4-BE49-F238E27FC236}">
-                <a16:creationId xmlns:a16="http://schemas.microsoft.com/office/drawing/2014/main" xmlns="" id="{63AA9F56-1F84-A545-BE3C-B025E321EB4D}"/>
+                <a16:creationId xmlns:a16="http://schemas.microsoft.com/office/drawing/2014/main" id="{63AA9F56-1F84-A545-BE3C-B025E321EB4D}"/>
               </a:ext>
             </a:extLst>
           </p:cNvPr>
@@ -2096,7 +2112,7 @@
           <p:cNvPr id="5" name="Rectangle 6">
             <a:extLst>
               <a:ext uri="{FF2B5EF4-FFF2-40B4-BE49-F238E27FC236}">
-                <a16:creationId xmlns:a16="http://schemas.microsoft.com/office/drawing/2014/main" xmlns="" id="{7B75B442-28E5-D247-8FA7-230A01F93BAC}"/>
+                <a16:creationId xmlns:a16="http://schemas.microsoft.com/office/drawing/2014/main" id="{7B75B442-28E5-D247-8FA7-230A01F93BAC}"/>
               </a:ext>
             </a:extLst>
           </p:cNvPr>
@@ -2157,7 +2173,7 @@
           <p:cNvPr id="2" name="Rectangle 4">
             <a:extLst>
               <a:ext uri="{FF2B5EF4-FFF2-40B4-BE49-F238E27FC236}">
-                <a16:creationId xmlns:a16="http://schemas.microsoft.com/office/drawing/2014/main" xmlns="" id="{4CE15B5C-EBA8-4248-8B0E-0114C5351BF4}"/>
+                <a16:creationId xmlns:a16="http://schemas.microsoft.com/office/drawing/2014/main" id="{4CE15B5C-EBA8-4248-8B0E-0114C5351BF4}"/>
               </a:ext>
             </a:extLst>
           </p:cNvPr>
@@ -2191,7 +2207,7 @@
           <p:cNvPr id="3" name="Rectangle 5">
             <a:extLst>
               <a:ext uri="{FF2B5EF4-FFF2-40B4-BE49-F238E27FC236}">
-                <a16:creationId xmlns:a16="http://schemas.microsoft.com/office/drawing/2014/main" xmlns="" id="{63AA9F56-1F84-A545-BE3C-B025E321EB4D}"/>
+                <a16:creationId xmlns:a16="http://schemas.microsoft.com/office/drawing/2014/main" id="{63AA9F56-1F84-A545-BE3C-B025E321EB4D}"/>
               </a:ext>
             </a:extLst>
           </p:cNvPr>
@@ -2225,7 +2241,7 @@
           <p:cNvPr id="4" name="Rectangle 6">
             <a:extLst>
               <a:ext uri="{FF2B5EF4-FFF2-40B4-BE49-F238E27FC236}">
-                <a16:creationId xmlns:a16="http://schemas.microsoft.com/office/drawing/2014/main" xmlns="" id="{7B75B442-28E5-D247-8FA7-230A01F93BAC}"/>
+                <a16:creationId xmlns:a16="http://schemas.microsoft.com/office/drawing/2014/main" id="{7B75B442-28E5-D247-8FA7-230A01F93BAC}"/>
               </a:ext>
             </a:extLst>
           </p:cNvPr>
@@ -2286,7 +2302,7 @@
           <p:cNvPr id="2" name="Title 1">
             <a:extLst>
               <a:ext uri="{FF2B5EF4-FFF2-40B4-BE49-F238E27FC236}">
-                <a16:creationId xmlns:a16="http://schemas.microsoft.com/office/drawing/2014/main" xmlns="" id="{97B5A053-A605-F148-92F6-DE6A84D2AE57}"/>
+                <a16:creationId xmlns:a16="http://schemas.microsoft.com/office/drawing/2014/main" id="{97B5A053-A605-F148-92F6-DE6A84D2AE57}"/>
               </a:ext>
             </a:extLst>
           </p:cNvPr>
@@ -2323,7 +2339,7 @@
           <p:cNvPr id="3" name="Content Placeholder 2">
             <a:extLst>
               <a:ext uri="{FF2B5EF4-FFF2-40B4-BE49-F238E27FC236}">
-                <a16:creationId xmlns:a16="http://schemas.microsoft.com/office/drawing/2014/main" xmlns="" id="{DCAD0897-FAD1-BD48-9A01-96EBA14E6B12}"/>
+                <a16:creationId xmlns:a16="http://schemas.microsoft.com/office/drawing/2014/main" id="{DCAD0897-FAD1-BD48-9A01-96EBA14E6B12}"/>
               </a:ext>
             </a:extLst>
           </p:cNvPr>
@@ -2413,7 +2429,7 @@
           <p:cNvPr id="4" name="Text Placeholder 3">
             <a:extLst>
               <a:ext uri="{FF2B5EF4-FFF2-40B4-BE49-F238E27FC236}">
-                <a16:creationId xmlns:a16="http://schemas.microsoft.com/office/drawing/2014/main" xmlns="" id="{78D8998C-0A04-4F4B-843D-C55D1139F2B9}"/>
+                <a16:creationId xmlns:a16="http://schemas.microsoft.com/office/drawing/2014/main" id="{78D8998C-0A04-4F4B-843D-C55D1139F2B9}"/>
               </a:ext>
             </a:extLst>
           </p:cNvPr>
@@ -2484,7 +2500,7 @@
           <p:cNvPr id="5" name="Rectangle 4">
             <a:extLst>
               <a:ext uri="{FF2B5EF4-FFF2-40B4-BE49-F238E27FC236}">
-                <a16:creationId xmlns:a16="http://schemas.microsoft.com/office/drawing/2014/main" xmlns="" id="{4CE15B5C-EBA8-4248-8B0E-0114C5351BF4}"/>
+                <a16:creationId xmlns:a16="http://schemas.microsoft.com/office/drawing/2014/main" id="{4CE15B5C-EBA8-4248-8B0E-0114C5351BF4}"/>
               </a:ext>
             </a:extLst>
           </p:cNvPr>
@@ -2518,7 +2534,7 @@
           <p:cNvPr id="6" name="Rectangle 5">
             <a:extLst>
               <a:ext uri="{FF2B5EF4-FFF2-40B4-BE49-F238E27FC236}">
-                <a16:creationId xmlns:a16="http://schemas.microsoft.com/office/drawing/2014/main" xmlns="" id="{63AA9F56-1F84-A545-BE3C-B025E321EB4D}"/>
+                <a16:creationId xmlns:a16="http://schemas.microsoft.com/office/drawing/2014/main" id="{63AA9F56-1F84-A545-BE3C-B025E321EB4D}"/>
               </a:ext>
             </a:extLst>
           </p:cNvPr>
@@ -2552,7 +2568,7 @@
           <p:cNvPr id="7" name="Rectangle 6">
             <a:extLst>
               <a:ext uri="{FF2B5EF4-FFF2-40B4-BE49-F238E27FC236}">
-                <a16:creationId xmlns:a16="http://schemas.microsoft.com/office/drawing/2014/main" xmlns="" id="{7B75B442-28E5-D247-8FA7-230A01F93BAC}"/>
+                <a16:creationId xmlns:a16="http://schemas.microsoft.com/office/drawing/2014/main" id="{7B75B442-28E5-D247-8FA7-230A01F93BAC}"/>
               </a:ext>
             </a:extLst>
           </p:cNvPr>
@@ -2613,7 +2629,7 @@
           <p:cNvPr id="2" name="Title 1">
             <a:extLst>
               <a:ext uri="{FF2B5EF4-FFF2-40B4-BE49-F238E27FC236}">
-                <a16:creationId xmlns:a16="http://schemas.microsoft.com/office/drawing/2014/main" xmlns="" id="{1C332D17-FC41-2140-AFBE-CF68904CF152}"/>
+                <a16:creationId xmlns:a16="http://schemas.microsoft.com/office/drawing/2014/main" id="{1C332D17-FC41-2140-AFBE-CF68904CF152}"/>
               </a:ext>
             </a:extLst>
           </p:cNvPr>
@@ -2650,7 +2666,7 @@
           <p:cNvPr id="3" name="Picture Placeholder 2">
             <a:extLst>
               <a:ext uri="{FF2B5EF4-FFF2-40B4-BE49-F238E27FC236}">
-                <a16:creationId xmlns:a16="http://schemas.microsoft.com/office/drawing/2014/main" xmlns="" id="{6BFCE136-7267-8148-B7E1-4D69AC0BD346}"/>
+                <a16:creationId xmlns:a16="http://schemas.microsoft.com/office/drawing/2014/main" id="{6BFCE136-7267-8148-B7E1-4D69AC0BD346}"/>
               </a:ext>
             </a:extLst>
           </p:cNvPr>
@@ -2718,7 +2734,7 @@
           <p:cNvPr id="4" name="Text Placeholder 3">
             <a:extLst>
               <a:ext uri="{FF2B5EF4-FFF2-40B4-BE49-F238E27FC236}">
-                <a16:creationId xmlns:a16="http://schemas.microsoft.com/office/drawing/2014/main" xmlns="" id="{8CCC89B3-7C83-9D49-9200-194EB70B0AB5}"/>
+                <a16:creationId xmlns:a16="http://schemas.microsoft.com/office/drawing/2014/main" id="{8CCC89B3-7C83-9D49-9200-194EB70B0AB5}"/>
               </a:ext>
             </a:extLst>
           </p:cNvPr>
@@ -2789,7 +2805,7 @@
           <p:cNvPr id="5" name="Rectangle 4">
             <a:extLst>
               <a:ext uri="{FF2B5EF4-FFF2-40B4-BE49-F238E27FC236}">
-                <a16:creationId xmlns:a16="http://schemas.microsoft.com/office/drawing/2014/main" xmlns="" id="{4CE15B5C-EBA8-4248-8B0E-0114C5351BF4}"/>
+                <a16:creationId xmlns:a16="http://schemas.microsoft.com/office/drawing/2014/main" id="{4CE15B5C-EBA8-4248-8B0E-0114C5351BF4}"/>
               </a:ext>
             </a:extLst>
           </p:cNvPr>
@@ -2823,7 +2839,7 @@
           <p:cNvPr id="6" name="Rectangle 5">
             <a:extLst>
               <a:ext uri="{FF2B5EF4-FFF2-40B4-BE49-F238E27FC236}">
-                <a16:creationId xmlns:a16="http://schemas.microsoft.com/office/drawing/2014/main" xmlns="" id="{63AA9F56-1F84-A545-BE3C-B025E321EB4D}"/>
+                <a16:creationId xmlns:a16="http://schemas.microsoft.com/office/drawing/2014/main" id="{63AA9F56-1F84-A545-BE3C-B025E321EB4D}"/>
               </a:ext>
             </a:extLst>
           </p:cNvPr>
@@ -2857,7 +2873,7 @@
           <p:cNvPr id="7" name="Rectangle 6">
             <a:extLst>
               <a:ext uri="{FF2B5EF4-FFF2-40B4-BE49-F238E27FC236}">
-                <a16:creationId xmlns:a16="http://schemas.microsoft.com/office/drawing/2014/main" xmlns="" id="{7B75B442-28E5-D247-8FA7-230A01F93BAC}"/>
+                <a16:creationId xmlns:a16="http://schemas.microsoft.com/office/drawing/2014/main" id="{7B75B442-28E5-D247-8FA7-230A01F93BAC}"/>
               </a:ext>
             </a:extLst>
           </p:cNvPr>
@@ -2962,7 +2978,7 @@
           <a:p>
             <a:pPr lvl="0"/>
             <a:r>
-              <a:rPr lang="es-ES" altLang="en-US" smtClean="0"/>
+              <a:rPr lang="es-ES" altLang="en-US"/>
               <a:t>Haga clic para cambiar el estilo de título	</a:t>
             </a:r>
           </a:p>
@@ -3005,35 +3021,35 @@
           <a:p>
             <a:pPr lvl="0"/>
             <a:r>
-              <a:rPr lang="es-ES" altLang="en-US" smtClean="0"/>
+              <a:rPr lang="es-ES" altLang="en-US"/>
               <a:t>Haga clic para modificar el estilo de texto del patrón</a:t>
             </a:r>
           </a:p>
           <a:p>
             <a:pPr lvl="1"/>
             <a:r>
-              <a:rPr lang="es-ES" altLang="en-US" smtClean="0"/>
+              <a:rPr lang="es-ES" altLang="en-US"/>
               <a:t>Segundo nivel</a:t>
             </a:r>
           </a:p>
           <a:p>
             <a:pPr lvl="2"/>
             <a:r>
-              <a:rPr lang="es-ES" altLang="en-US" smtClean="0"/>
+              <a:rPr lang="es-ES" altLang="en-US"/>
               <a:t>Tercer nivel</a:t>
             </a:r>
           </a:p>
           <a:p>
             <a:pPr lvl="3"/>
             <a:r>
-              <a:rPr lang="es-ES" altLang="en-US" smtClean="0"/>
+              <a:rPr lang="es-ES" altLang="en-US"/>
               <a:t>Cuarto nivel</a:t>
             </a:r>
           </a:p>
           <a:p>
             <a:pPr lvl="4"/>
             <a:r>
-              <a:rPr lang="es-ES" altLang="en-US" smtClean="0"/>
+              <a:rPr lang="es-ES" altLang="en-US"/>
               <a:t>Quinto nivel</a:t>
             </a:r>
           </a:p>
@@ -3044,7 +3060,7 @@
           <p:cNvPr id="1028" name="Rectangle 4">
             <a:extLst>
               <a:ext uri="{FF2B5EF4-FFF2-40B4-BE49-F238E27FC236}">
-                <a16:creationId xmlns:a16="http://schemas.microsoft.com/office/drawing/2014/main" xmlns="" id="{4CE15B5C-EBA8-4248-8B0E-0114C5351BF4}"/>
+                <a16:creationId xmlns:a16="http://schemas.microsoft.com/office/drawing/2014/main" id="{4CE15B5C-EBA8-4248-8B0E-0114C5351BF4}"/>
               </a:ext>
             </a:extLst>
           </p:cNvPr>
@@ -3070,14 +3086,14 @@
           <a:effectLst/>
           <a:extLst>
             <a:ext uri="{909E8E84-426E-40DD-AFC4-6F175D3DCCD1}">
-              <a14:hiddenFill xmlns:a14="http://schemas.microsoft.com/office/drawing/2010/main" xmlns="">
+              <a14:hiddenFill xmlns:a14="http://schemas.microsoft.com/office/drawing/2010/main">
                 <a:solidFill>
                   <a:schemeClr val="accent1"/>
                 </a:solidFill>
               </a14:hiddenFill>
             </a:ext>
             <a:ext uri="{91240B29-F687-4F45-9708-019B960494DF}">
-              <a14:hiddenLine xmlns:a14="http://schemas.microsoft.com/office/drawing/2010/main" xmlns="" w="9525">
+              <a14:hiddenLine xmlns:a14="http://schemas.microsoft.com/office/drawing/2010/main" w="9525">
                 <a:solidFill>
                   <a:schemeClr val="tx1"/>
                 </a:solidFill>
@@ -3087,7 +3103,7 @@
               </a14:hiddenLine>
             </a:ext>
             <a:ext uri="{AF507438-7753-43E0-B8FC-AC1667EBCBE1}">
-              <a14:hiddenEffects xmlns:a14="http://schemas.microsoft.com/office/drawing/2010/main" xmlns="">
+              <a14:hiddenEffects xmlns:a14="http://schemas.microsoft.com/office/drawing/2010/main">
                 <a:effectLst>
                   <a:outerShdw dist="35921" dir="2700000" algn="ctr" rotWithShape="0">
                     <a:schemeClr val="bg2"/>
@@ -3123,7 +3139,7 @@
           <p:cNvPr id="1029" name="Rectangle 5">
             <a:extLst>
               <a:ext uri="{FF2B5EF4-FFF2-40B4-BE49-F238E27FC236}">
-                <a16:creationId xmlns:a16="http://schemas.microsoft.com/office/drawing/2014/main" xmlns="" id="{63AA9F56-1F84-A545-BE3C-B025E321EB4D}"/>
+                <a16:creationId xmlns:a16="http://schemas.microsoft.com/office/drawing/2014/main" id="{63AA9F56-1F84-A545-BE3C-B025E321EB4D}"/>
               </a:ext>
             </a:extLst>
           </p:cNvPr>
@@ -3149,14 +3165,14 @@
           <a:effectLst/>
           <a:extLst>
             <a:ext uri="{909E8E84-426E-40DD-AFC4-6F175D3DCCD1}">
-              <a14:hiddenFill xmlns:a14="http://schemas.microsoft.com/office/drawing/2010/main" xmlns="">
+              <a14:hiddenFill xmlns:a14="http://schemas.microsoft.com/office/drawing/2010/main">
                 <a:solidFill>
                   <a:schemeClr val="accent1"/>
                 </a:solidFill>
               </a14:hiddenFill>
             </a:ext>
             <a:ext uri="{91240B29-F687-4F45-9708-019B960494DF}">
-              <a14:hiddenLine xmlns:a14="http://schemas.microsoft.com/office/drawing/2010/main" xmlns="" w="9525">
+              <a14:hiddenLine xmlns:a14="http://schemas.microsoft.com/office/drawing/2010/main" w="9525">
                 <a:solidFill>
                   <a:schemeClr val="tx1"/>
                 </a:solidFill>
@@ -3166,7 +3182,7 @@
               </a14:hiddenLine>
             </a:ext>
             <a:ext uri="{AF507438-7753-43E0-B8FC-AC1667EBCBE1}">
-              <a14:hiddenEffects xmlns:a14="http://schemas.microsoft.com/office/drawing/2010/main" xmlns="">
+              <a14:hiddenEffects xmlns:a14="http://schemas.microsoft.com/office/drawing/2010/main">
                 <a:effectLst>
                   <a:outerShdw dist="35921" dir="2700000" algn="ctr" rotWithShape="0">
                     <a:schemeClr val="bg2"/>
@@ -3202,7 +3218,7 @@
           <p:cNvPr id="1030" name="Rectangle 6">
             <a:extLst>
               <a:ext uri="{FF2B5EF4-FFF2-40B4-BE49-F238E27FC236}">
-                <a16:creationId xmlns:a16="http://schemas.microsoft.com/office/drawing/2014/main" xmlns="" id="{7B75B442-28E5-D247-8FA7-230A01F93BAC}"/>
+                <a16:creationId xmlns:a16="http://schemas.microsoft.com/office/drawing/2014/main" id="{7B75B442-28E5-D247-8FA7-230A01F93BAC}"/>
               </a:ext>
             </a:extLst>
           </p:cNvPr>
@@ -3228,14 +3244,14 @@
           <a:effectLst/>
           <a:extLst>
             <a:ext uri="{909E8E84-426E-40DD-AFC4-6F175D3DCCD1}">
-              <a14:hiddenFill xmlns:a14="http://schemas.microsoft.com/office/drawing/2010/main" xmlns="">
+              <a14:hiddenFill xmlns:a14="http://schemas.microsoft.com/office/drawing/2010/main">
                 <a:solidFill>
                   <a:schemeClr val="accent1"/>
                 </a:solidFill>
               </a14:hiddenFill>
             </a:ext>
             <a:ext uri="{91240B29-F687-4F45-9708-019B960494DF}">
-              <a14:hiddenLine xmlns:a14="http://schemas.microsoft.com/office/drawing/2010/main" xmlns="" w="9525">
+              <a14:hiddenLine xmlns:a14="http://schemas.microsoft.com/office/drawing/2010/main" w="9525">
                 <a:solidFill>
                   <a:schemeClr val="tx1"/>
                 </a:solidFill>
@@ -3245,7 +3261,7 @@
               </a14:hiddenLine>
             </a:ext>
             <a:ext uri="{AF507438-7753-43E0-B8FC-AC1667EBCBE1}">
-              <a14:hiddenEffects xmlns:a14="http://schemas.microsoft.com/office/drawing/2010/main" xmlns="">
+              <a14:hiddenEffects xmlns:a14="http://schemas.microsoft.com/office/drawing/2010/main">
                 <a:effectLst>
                   <a:outerShdw dist="35921" dir="2700000" algn="ctr" rotWithShape="0">
                     <a:schemeClr val="bg2"/>
@@ -3732,7 +3748,7 @@
           <a:p>
             <a:pPr algn="l" eaLnBrk="1" hangingPunct="1"/>
             <a:r>
-              <a:rPr lang="es-UY" altLang="en-US" sz="2000" dirty="0" err="1" smtClean="0">
+              <a:rPr lang="es-UY" altLang="en-US" sz="2000" dirty="0" err="1">
                 <a:solidFill>
                   <a:schemeClr val="tx1"/>
                 </a:solidFill>
@@ -3741,7 +3757,7 @@
               <a:t>Representation</a:t>
             </a:r>
             <a:r>
-              <a:rPr lang="es-UY" altLang="en-US" sz="2000" dirty="0" smtClean="0">
+              <a:rPr lang="es-UY" altLang="en-US" sz="2000" dirty="0">
                 <a:solidFill>
                   <a:schemeClr val="tx1"/>
                 </a:solidFill>
@@ -3750,7 +3766,7 @@
               <a:t> of </a:t>
             </a:r>
             <a:r>
-              <a:rPr lang="es-UY" altLang="en-US" sz="2000" dirty="0" err="1" smtClean="0">
+              <a:rPr lang="es-UY" altLang="en-US" sz="2000" dirty="0" err="1">
                 <a:solidFill>
                   <a:schemeClr val="tx1"/>
                 </a:solidFill>
@@ -3759,7 +3775,7 @@
               <a:t>Breweries</a:t>
             </a:r>
             <a:r>
-              <a:rPr lang="es-UY" altLang="en-US" sz="2000" dirty="0" smtClean="0">
+              <a:rPr lang="es-UY" altLang="en-US" sz="2000" dirty="0">
                 <a:solidFill>
                   <a:schemeClr val="tx1"/>
                 </a:solidFill>
@@ -3768,7 +3784,7 @@
               <a:t> </a:t>
             </a:r>
             <a:r>
-              <a:rPr lang="es-UY" altLang="en-US" sz="2000" dirty="0" err="1" smtClean="0">
+              <a:rPr lang="es-UY" altLang="en-US" sz="2000" dirty="0" err="1">
                 <a:solidFill>
                   <a:schemeClr val="tx1"/>
                 </a:solidFill>
@@ -3777,7 +3793,7 @@
               <a:t>by</a:t>
             </a:r>
             <a:r>
-              <a:rPr lang="es-UY" altLang="en-US" sz="2000" dirty="0" smtClean="0">
+              <a:rPr lang="es-UY" altLang="en-US" sz="2000" dirty="0">
                 <a:solidFill>
                   <a:schemeClr val="tx1"/>
                 </a:solidFill>
@@ -3786,7 +3802,7 @@
               <a:t> </a:t>
             </a:r>
             <a:r>
-              <a:rPr lang="es-UY" altLang="en-US" sz="2000" dirty="0" err="1" smtClean="0">
+              <a:rPr lang="es-UY" altLang="en-US" sz="2000" dirty="0" err="1">
                 <a:solidFill>
                   <a:schemeClr val="tx1"/>
                 </a:solidFill>
@@ -3794,7 +3810,7 @@
               </a:rPr>
               <a:t>State</a:t>
             </a:r>
-            <a:endParaRPr lang="es-ES" altLang="en-US" sz="2000" dirty="0" smtClean="0">
+            <a:endParaRPr lang="es-ES" altLang="en-US" sz="2000" dirty="0">
               <a:solidFill>
                 <a:schemeClr val="tx1"/>
               </a:solidFill>
@@ -3922,7 +3938,7 @@
           <a:p>
             <a:pPr eaLnBrk="1" hangingPunct="1"/>
             <a:r>
-              <a:rPr lang="es-UY" altLang="en-US" sz="2400" dirty="0" err="1" smtClean="0">
+              <a:rPr lang="es-UY" altLang="en-US" sz="2400" dirty="0" err="1">
                 <a:solidFill>
                   <a:schemeClr val="tx1"/>
                 </a:solidFill>
@@ -3931,7 +3947,7 @@
               <a:t>Number</a:t>
             </a:r>
             <a:r>
-              <a:rPr lang="es-UY" altLang="en-US" sz="2400" dirty="0" smtClean="0">
+              <a:rPr lang="es-UY" altLang="en-US" sz="2400" dirty="0">
                 <a:solidFill>
                   <a:schemeClr val="tx1"/>
                 </a:solidFill>
@@ -3940,7 +3956,7 @@
               <a:t> of </a:t>
             </a:r>
             <a:r>
-              <a:rPr lang="es-UY" altLang="en-US" sz="2400" dirty="0" err="1" smtClean="0">
+              <a:rPr lang="es-UY" altLang="en-US" sz="2400" dirty="0" err="1">
                 <a:solidFill>
                   <a:schemeClr val="tx1"/>
                 </a:solidFill>
@@ -3949,7 +3965,7 @@
               <a:t>Breweries</a:t>
             </a:r>
             <a:r>
-              <a:rPr lang="es-UY" altLang="en-US" sz="2400" dirty="0" smtClean="0">
+              <a:rPr lang="es-UY" altLang="en-US" sz="2400" dirty="0">
                 <a:solidFill>
                   <a:schemeClr val="tx1"/>
                 </a:solidFill>
@@ -3958,7 +3974,7 @@
               <a:t> in </a:t>
             </a:r>
             <a:r>
-              <a:rPr lang="es-UY" altLang="en-US" sz="2400" dirty="0" err="1" smtClean="0">
+              <a:rPr lang="es-UY" altLang="en-US" sz="2400" dirty="0" err="1">
                 <a:solidFill>
                   <a:schemeClr val="tx1"/>
                 </a:solidFill>
@@ -3967,7 +3983,7 @@
               <a:t>each</a:t>
             </a:r>
             <a:r>
-              <a:rPr lang="es-UY" altLang="en-US" sz="2400" dirty="0" smtClean="0">
+              <a:rPr lang="es-UY" altLang="en-US" sz="2400" dirty="0">
                 <a:solidFill>
                   <a:schemeClr val="tx1"/>
                 </a:solidFill>
@@ -3976,7 +3992,7 @@
               <a:t> </a:t>
             </a:r>
             <a:r>
-              <a:rPr lang="es-UY" altLang="en-US" sz="2400" dirty="0" err="1" smtClean="0">
+              <a:rPr lang="es-UY" altLang="en-US" sz="2400" dirty="0" err="1">
                 <a:solidFill>
                   <a:schemeClr val="tx1"/>
                 </a:solidFill>
@@ -3984,7 +4000,7 @@
               </a:rPr>
               <a:t>state</a:t>
             </a:r>
-            <a:endParaRPr lang="es-ES" altLang="en-US" sz="2400" dirty="0" smtClean="0">
+            <a:endParaRPr lang="es-ES" altLang="en-US" sz="2400" dirty="0">
               <a:solidFill>
                 <a:schemeClr val="tx1"/>
               </a:solidFill>
@@ -4010,9 +4026,27 @@
             <a:tbl>
               <a:tblPr/>
               <a:tblGrid>
-                <a:gridCol w="720080"/>
-                <a:gridCol w="720080"/>
-                <a:gridCol w="720080"/>
+                <a:gridCol w="720080">
+                  <a:extLst>
+                    <a:ext uri="{9D8B030D-6E8A-4147-A177-3AD203B41FA5}">
+                      <a16:colId xmlns:a16="http://schemas.microsoft.com/office/drawing/2014/main" val="20000"/>
+                    </a:ext>
+                  </a:extLst>
+                </a:gridCol>
+                <a:gridCol w="720080">
+                  <a:extLst>
+                    <a:ext uri="{9D8B030D-6E8A-4147-A177-3AD203B41FA5}">
+                      <a16:colId xmlns:a16="http://schemas.microsoft.com/office/drawing/2014/main" val="20001"/>
+                    </a:ext>
+                  </a:extLst>
+                </a:gridCol>
+                <a:gridCol w="720080">
+                  <a:extLst>
+                    <a:ext uri="{9D8B030D-6E8A-4147-A177-3AD203B41FA5}">
+                      <a16:colId xmlns:a16="http://schemas.microsoft.com/office/drawing/2014/main" val="20002"/>
+                    </a:ext>
+                  </a:extLst>
+                </a:gridCol>
               </a:tblGrid>
               <a:tr h="216332">
                 <a:tc>
@@ -4111,6 +4145,11 @@
                     </a:lnB>
                   </a:tcPr>
                 </a:tc>
+                <a:extLst>
+                  <a:ext uri="{0D108BD9-81ED-4DB2-BD59-A6C34878D82A}">
+                    <a16:rowId xmlns:a16="http://schemas.microsoft.com/office/drawing/2014/main" val="10000"/>
+                  </a:ext>
+                </a:extLst>
               </a:tr>
               <a:tr h="216332">
                 <a:tc>
@@ -4218,6 +4257,11 @@
                     </a:solidFill>
                   </a:tcPr>
                 </a:tc>
+                <a:extLst>
+                  <a:ext uri="{0D108BD9-81ED-4DB2-BD59-A6C34878D82A}">
+                    <a16:rowId xmlns:a16="http://schemas.microsoft.com/office/drawing/2014/main" val="10001"/>
+                  </a:ext>
+                </a:extLst>
               </a:tr>
               <a:tr h="216332">
                 <a:tc>
@@ -4316,6 +4360,11 @@
                     </a:lnB>
                   </a:tcPr>
                 </a:tc>
+                <a:extLst>
+                  <a:ext uri="{0D108BD9-81ED-4DB2-BD59-A6C34878D82A}">
+                    <a16:rowId xmlns:a16="http://schemas.microsoft.com/office/drawing/2014/main" val="10002"/>
+                  </a:ext>
+                </a:extLst>
               </a:tr>
               <a:tr h="216332">
                 <a:tc>
@@ -4414,6 +4463,11 @@
                     </a:lnB>
                   </a:tcPr>
                 </a:tc>
+                <a:extLst>
+                  <a:ext uri="{0D108BD9-81ED-4DB2-BD59-A6C34878D82A}">
+                    <a16:rowId xmlns:a16="http://schemas.microsoft.com/office/drawing/2014/main" val="10003"/>
+                  </a:ext>
+                </a:extLst>
               </a:tr>
               <a:tr h="216332">
                 <a:tc>
@@ -4512,6 +4566,11 @@
                     </a:lnB>
                   </a:tcPr>
                 </a:tc>
+                <a:extLst>
+                  <a:ext uri="{0D108BD9-81ED-4DB2-BD59-A6C34878D82A}">
+                    <a16:rowId xmlns:a16="http://schemas.microsoft.com/office/drawing/2014/main" val="10004"/>
+                  </a:ext>
+                </a:extLst>
               </a:tr>
               <a:tr h="216332">
                 <a:tc>
@@ -4610,6 +4669,11 @@
                     </a:lnB>
                   </a:tcPr>
                 </a:tc>
+                <a:extLst>
+                  <a:ext uri="{0D108BD9-81ED-4DB2-BD59-A6C34878D82A}">
+                    <a16:rowId xmlns:a16="http://schemas.microsoft.com/office/drawing/2014/main" val="10005"/>
+                  </a:ext>
+                </a:extLst>
               </a:tr>
               <a:tr h="216332">
                 <a:tc>
@@ -4708,6 +4772,11 @@
                     </a:lnB>
                   </a:tcPr>
                 </a:tc>
+                <a:extLst>
+                  <a:ext uri="{0D108BD9-81ED-4DB2-BD59-A6C34878D82A}">
+                    <a16:rowId xmlns:a16="http://schemas.microsoft.com/office/drawing/2014/main" val="10006"/>
+                  </a:ext>
+                </a:extLst>
               </a:tr>
               <a:tr h="216332">
                 <a:tc>
@@ -4806,6 +4875,11 @@
                     </a:lnB>
                   </a:tcPr>
                 </a:tc>
+                <a:extLst>
+                  <a:ext uri="{0D108BD9-81ED-4DB2-BD59-A6C34878D82A}">
+                    <a16:rowId xmlns:a16="http://schemas.microsoft.com/office/drawing/2014/main" val="10007"/>
+                  </a:ext>
+                </a:extLst>
               </a:tr>
               <a:tr h="216332">
                 <a:tc>
@@ -4904,6 +4978,11 @@
                     </a:lnB>
                   </a:tcPr>
                 </a:tc>
+                <a:extLst>
+                  <a:ext uri="{0D108BD9-81ED-4DB2-BD59-A6C34878D82A}">
+                    <a16:rowId xmlns:a16="http://schemas.microsoft.com/office/drawing/2014/main" val="10008"/>
+                  </a:ext>
+                </a:extLst>
               </a:tr>
               <a:tr h="216332">
                 <a:tc>
@@ -5002,6 +5081,11 @@
                     </a:lnB>
                   </a:tcPr>
                 </a:tc>
+                <a:extLst>
+                  <a:ext uri="{0D108BD9-81ED-4DB2-BD59-A6C34878D82A}">
+                    <a16:rowId xmlns:a16="http://schemas.microsoft.com/office/drawing/2014/main" val="10009"/>
+                  </a:ext>
+                </a:extLst>
               </a:tr>
               <a:tr h="216332">
                 <a:tc>
@@ -5100,6 +5184,11 @@
                     </a:lnB>
                   </a:tcPr>
                 </a:tc>
+                <a:extLst>
+                  <a:ext uri="{0D108BD9-81ED-4DB2-BD59-A6C34878D82A}">
+                    <a16:rowId xmlns:a16="http://schemas.microsoft.com/office/drawing/2014/main" val="10010"/>
+                  </a:ext>
+                </a:extLst>
               </a:tr>
               <a:tr h="216332">
                 <a:tc>
@@ -5198,6 +5287,11 @@
                     </a:lnB>
                   </a:tcPr>
                 </a:tc>
+                <a:extLst>
+                  <a:ext uri="{0D108BD9-81ED-4DB2-BD59-A6C34878D82A}">
+                    <a16:rowId xmlns:a16="http://schemas.microsoft.com/office/drawing/2014/main" val="10011"/>
+                  </a:ext>
+                </a:extLst>
               </a:tr>
               <a:tr h="216332">
                 <a:tc>
@@ -5296,6 +5390,11 @@
                     </a:lnB>
                   </a:tcPr>
                 </a:tc>
+                <a:extLst>
+                  <a:ext uri="{0D108BD9-81ED-4DB2-BD59-A6C34878D82A}">
+                    <a16:rowId xmlns:a16="http://schemas.microsoft.com/office/drawing/2014/main" val="10012"/>
+                  </a:ext>
+                </a:extLst>
               </a:tr>
               <a:tr h="216332">
                 <a:tc>
@@ -5394,6 +5493,11 @@
                     </a:lnB>
                   </a:tcPr>
                 </a:tc>
+                <a:extLst>
+                  <a:ext uri="{0D108BD9-81ED-4DB2-BD59-A6C34878D82A}">
+                    <a16:rowId xmlns:a16="http://schemas.microsoft.com/office/drawing/2014/main" val="10013"/>
+                  </a:ext>
+                </a:extLst>
               </a:tr>
               <a:tr h="216332">
                 <a:tc>
@@ -5492,6 +5596,11 @@
                     </a:lnB>
                   </a:tcPr>
                 </a:tc>
+                <a:extLst>
+                  <a:ext uri="{0D108BD9-81ED-4DB2-BD59-A6C34878D82A}">
+                    <a16:rowId xmlns:a16="http://schemas.microsoft.com/office/drawing/2014/main" val="10014"/>
+                  </a:ext>
+                </a:extLst>
               </a:tr>
               <a:tr h="216332">
                 <a:tc>
@@ -5590,6 +5699,11 @@
                     </a:lnB>
                   </a:tcPr>
                 </a:tc>
+                <a:extLst>
+                  <a:ext uri="{0D108BD9-81ED-4DB2-BD59-A6C34878D82A}">
+                    <a16:rowId xmlns:a16="http://schemas.microsoft.com/office/drawing/2014/main" val="10015"/>
+                  </a:ext>
+                </a:extLst>
               </a:tr>
               <a:tr h="216332">
                 <a:tc>
@@ -5688,6 +5802,11 @@
                     </a:lnB>
                   </a:tcPr>
                 </a:tc>
+                <a:extLst>
+                  <a:ext uri="{0D108BD9-81ED-4DB2-BD59-A6C34878D82A}">
+                    <a16:rowId xmlns:a16="http://schemas.microsoft.com/office/drawing/2014/main" val="10016"/>
+                  </a:ext>
+                </a:extLst>
               </a:tr>
               <a:tr h="216332">
                 <a:tc>
@@ -5786,6 +5905,11 @@
                     </a:lnB>
                   </a:tcPr>
                 </a:tc>
+                <a:extLst>
+                  <a:ext uri="{0D108BD9-81ED-4DB2-BD59-A6C34878D82A}">
+                    <a16:rowId xmlns:a16="http://schemas.microsoft.com/office/drawing/2014/main" val="10017"/>
+                  </a:ext>
+                </a:extLst>
               </a:tr>
               <a:tr h="216332">
                 <a:tc>
@@ -5884,6 +6008,11 @@
                     </a:lnB>
                   </a:tcPr>
                 </a:tc>
+                <a:extLst>
+                  <a:ext uri="{0D108BD9-81ED-4DB2-BD59-A6C34878D82A}">
+                    <a16:rowId xmlns:a16="http://schemas.microsoft.com/office/drawing/2014/main" val="10018"/>
+                  </a:ext>
+                </a:extLst>
               </a:tr>
               <a:tr h="216332">
                 <a:tc>
@@ -5982,6 +6111,11 @@
                     </a:lnB>
                   </a:tcPr>
                 </a:tc>
+                <a:extLst>
+                  <a:ext uri="{0D108BD9-81ED-4DB2-BD59-A6C34878D82A}">
+                    <a16:rowId xmlns:a16="http://schemas.microsoft.com/office/drawing/2014/main" val="10019"/>
+                  </a:ext>
+                </a:extLst>
               </a:tr>
               <a:tr h="216332">
                 <a:tc>
@@ -6080,6 +6214,11 @@
                     </a:lnB>
                   </a:tcPr>
                 </a:tc>
+                <a:extLst>
+                  <a:ext uri="{0D108BD9-81ED-4DB2-BD59-A6C34878D82A}">
+                    <a16:rowId xmlns:a16="http://schemas.microsoft.com/office/drawing/2014/main" val="10020"/>
+                  </a:ext>
+                </a:extLst>
               </a:tr>
             </a:tbl>
           </a:graphicData>
@@ -6102,9 +6241,27 @@
             <a:tbl>
               <a:tblPr/>
               <a:tblGrid>
-                <a:gridCol w="696077"/>
-                <a:gridCol w="696077"/>
-                <a:gridCol w="696077"/>
+                <a:gridCol w="696077">
+                  <a:extLst>
+                    <a:ext uri="{9D8B030D-6E8A-4147-A177-3AD203B41FA5}">
+                      <a16:colId xmlns:a16="http://schemas.microsoft.com/office/drawing/2014/main" val="20000"/>
+                    </a:ext>
+                  </a:extLst>
+                </a:gridCol>
+                <a:gridCol w="696077">
+                  <a:extLst>
+                    <a:ext uri="{9D8B030D-6E8A-4147-A177-3AD203B41FA5}">
+                      <a16:colId xmlns:a16="http://schemas.microsoft.com/office/drawing/2014/main" val="20001"/>
+                    </a:ext>
+                  </a:extLst>
+                </a:gridCol>
+                <a:gridCol w="696077">
+                  <a:extLst>
+                    <a:ext uri="{9D8B030D-6E8A-4147-A177-3AD203B41FA5}">
+                      <a16:colId xmlns:a16="http://schemas.microsoft.com/office/drawing/2014/main" val="20002"/>
+                    </a:ext>
+                  </a:extLst>
+                </a:gridCol>
               </a:tblGrid>
               <a:tr h="150519">
                 <a:tc>
@@ -6203,6 +6360,11 @@
                     </a:lnB>
                   </a:tcPr>
                 </a:tc>
+                <a:extLst>
+                  <a:ext uri="{0D108BD9-81ED-4DB2-BD59-A6C34878D82A}">
+                    <a16:rowId xmlns:a16="http://schemas.microsoft.com/office/drawing/2014/main" val="10000"/>
+                  </a:ext>
+                </a:extLst>
               </a:tr>
               <a:tr h="150519">
                 <a:tc>
@@ -6301,6 +6463,11 @@
                     </a:lnB>
                   </a:tcPr>
                 </a:tc>
+                <a:extLst>
+                  <a:ext uri="{0D108BD9-81ED-4DB2-BD59-A6C34878D82A}">
+                    <a16:rowId xmlns:a16="http://schemas.microsoft.com/office/drawing/2014/main" val="10001"/>
+                  </a:ext>
+                </a:extLst>
               </a:tr>
               <a:tr h="150519">
                 <a:tc>
@@ -6399,6 +6566,11 @@
                     </a:lnB>
                   </a:tcPr>
                 </a:tc>
+                <a:extLst>
+                  <a:ext uri="{0D108BD9-81ED-4DB2-BD59-A6C34878D82A}">
+                    <a16:rowId xmlns:a16="http://schemas.microsoft.com/office/drawing/2014/main" val="10002"/>
+                  </a:ext>
+                </a:extLst>
               </a:tr>
               <a:tr h="150519">
                 <a:tc>
@@ -6497,6 +6669,11 @@
                     </a:lnB>
                   </a:tcPr>
                 </a:tc>
+                <a:extLst>
+                  <a:ext uri="{0D108BD9-81ED-4DB2-BD59-A6C34878D82A}">
+                    <a16:rowId xmlns:a16="http://schemas.microsoft.com/office/drawing/2014/main" val="10003"/>
+                  </a:ext>
+                </a:extLst>
               </a:tr>
               <a:tr h="150519">
                 <a:tc>
@@ -6595,6 +6772,11 @@
                     </a:lnB>
                   </a:tcPr>
                 </a:tc>
+                <a:extLst>
+                  <a:ext uri="{0D108BD9-81ED-4DB2-BD59-A6C34878D82A}">
+                    <a16:rowId xmlns:a16="http://schemas.microsoft.com/office/drawing/2014/main" val="10004"/>
+                  </a:ext>
+                </a:extLst>
               </a:tr>
               <a:tr h="150519">
                 <a:tc>
@@ -6693,6 +6875,11 @@
                     </a:lnB>
                   </a:tcPr>
                 </a:tc>
+                <a:extLst>
+                  <a:ext uri="{0D108BD9-81ED-4DB2-BD59-A6C34878D82A}">
+                    <a16:rowId xmlns:a16="http://schemas.microsoft.com/office/drawing/2014/main" val="10005"/>
+                  </a:ext>
+                </a:extLst>
               </a:tr>
               <a:tr h="150519">
                 <a:tc>
@@ -6791,6 +6978,11 @@
                     </a:lnB>
                   </a:tcPr>
                 </a:tc>
+                <a:extLst>
+                  <a:ext uri="{0D108BD9-81ED-4DB2-BD59-A6C34878D82A}">
+                    <a16:rowId xmlns:a16="http://schemas.microsoft.com/office/drawing/2014/main" val="10006"/>
+                  </a:ext>
+                </a:extLst>
               </a:tr>
               <a:tr h="150519">
                 <a:tc>
@@ -6889,6 +7081,11 @@
                     </a:lnB>
                   </a:tcPr>
                 </a:tc>
+                <a:extLst>
+                  <a:ext uri="{0D108BD9-81ED-4DB2-BD59-A6C34878D82A}">
+                    <a16:rowId xmlns:a16="http://schemas.microsoft.com/office/drawing/2014/main" val="10007"/>
+                  </a:ext>
+                </a:extLst>
               </a:tr>
               <a:tr h="150519">
                 <a:tc>
@@ -6987,6 +7184,11 @@
                     </a:lnB>
                   </a:tcPr>
                 </a:tc>
+                <a:extLst>
+                  <a:ext uri="{0D108BD9-81ED-4DB2-BD59-A6C34878D82A}">
+                    <a16:rowId xmlns:a16="http://schemas.microsoft.com/office/drawing/2014/main" val="10008"/>
+                  </a:ext>
+                </a:extLst>
               </a:tr>
               <a:tr h="150519">
                 <a:tc>
@@ -7085,6 +7287,11 @@
                     </a:lnB>
                   </a:tcPr>
                 </a:tc>
+                <a:extLst>
+                  <a:ext uri="{0D108BD9-81ED-4DB2-BD59-A6C34878D82A}">
+                    <a16:rowId xmlns:a16="http://schemas.microsoft.com/office/drawing/2014/main" val="10009"/>
+                  </a:ext>
+                </a:extLst>
               </a:tr>
               <a:tr h="150519">
                 <a:tc>
@@ -7183,6 +7390,11 @@
                     </a:lnB>
                   </a:tcPr>
                 </a:tc>
+                <a:extLst>
+                  <a:ext uri="{0D108BD9-81ED-4DB2-BD59-A6C34878D82A}">
+                    <a16:rowId xmlns:a16="http://schemas.microsoft.com/office/drawing/2014/main" val="10010"/>
+                  </a:ext>
+                </a:extLst>
               </a:tr>
               <a:tr h="150519">
                 <a:tc>
@@ -7281,6 +7493,11 @@
                     </a:lnB>
                   </a:tcPr>
                 </a:tc>
+                <a:extLst>
+                  <a:ext uri="{0D108BD9-81ED-4DB2-BD59-A6C34878D82A}">
+                    <a16:rowId xmlns:a16="http://schemas.microsoft.com/office/drawing/2014/main" val="10011"/>
+                  </a:ext>
+                </a:extLst>
               </a:tr>
               <a:tr h="150519">
                 <a:tc>
@@ -7379,6 +7596,11 @@
                     </a:lnB>
                   </a:tcPr>
                 </a:tc>
+                <a:extLst>
+                  <a:ext uri="{0D108BD9-81ED-4DB2-BD59-A6C34878D82A}">
+                    <a16:rowId xmlns:a16="http://schemas.microsoft.com/office/drawing/2014/main" val="10012"/>
+                  </a:ext>
+                </a:extLst>
               </a:tr>
               <a:tr h="150519">
                 <a:tc>
@@ -7477,6 +7699,11 @@
                     </a:lnB>
                   </a:tcPr>
                 </a:tc>
+                <a:extLst>
+                  <a:ext uri="{0D108BD9-81ED-4DB2-BD59-A6C34878D82A}">
+                    <a16:rowId xmlns:a16="http://schemas.microsoft.com/office/drawing/2014/main" val="10013"/>
+                  </a:ext>
+                </a:extLst>
               </a:tr>
               <a:tr h="150519">
                 <a:tc>
@@ -7575,6 +7802,11 @@
                     </a:lnB>
                   </a:tcPr>
                 </a:tc>
+                <a:extLst>
+                  <a:ext uri="{0D108BD9-81ED-4DB2-BD59-A6C34878D82A}">
+                    <a16:rowId xmlns:a16="http://schemas.microsoft.com/office/drawing/2014/main" val="10014"/>
+                  </a:ext>
+                </a:extLst>
               </a:tr>
               <a:tr h="150519">
                 <a:tc>
@@ -7673,6 +7905,11 @@
                     </a:lnB>
                   </a:tcPr>
                 </a:tc>
+                <a:extLst>
+                  <a:ext uri="{0D108BD9-81ED-4DB2-BD59-A6C34878D82A}">
+                    <a16:rowId xmlns:a16="http://schemas.microsoft.com/office/drawing/2014/main" val="10015"/>
+                  </a:ext>
+                </a:extLst>
               </a:tr>
               <a:tr h="150519">
                 <a:tc>
@@ -7771,6 +8008,11 @@
                     </a:lnB>
                   </a:tcPr>
                 </a:tc>
+                <a:extLst>
+                  <a:ext uri="{0D108BD9-81ED-4DB2-BD59-A6C34878D82A}">
+                    <a16:rowId xmlns:a16="http://schemas.microsoft.com/office/drawing/2014/main" val="10016"/>
+                  </a:ext>
+                </a:extLst>
               </a:tr>
               <a:tr h="150519">
                 <a:tc>
@@ -7869,6 +8111,11 @@
                     </a:lnB>
                   </a:tcPr>
                 </a:tc>
+                <a:extLst>
+                  <a:ext uri="{0D108BD9-81ED-4DB2-BD59-A6C34878D82A}">
+                    <a16:rowId xmlns:a16="http://schemas.microsoft.com/office/drawing/2014/main" val="10017"/>
+                  </a:ext>
+                </a:extLst>
               </a:tr>
               <a:tr h="150519">
                 <a:tc>
@@ -7967,6 +8214,11 @@
                     </a:lnB>
                   </a:tcPr>
                 </a:tc>
+                <a:extLst>
+                  <a:ext uri="{0D108BD9-81ED-4DB2-BD59-A6C34878D82A}">
+                    <a16:rowId xmlns:a16="http://schemas.microsoft.com/office/drawing/2014/main" val="10018"/>
+                  </a:ext>
+                </a:extLst>
               </a:tr>
               <a:tr h="150519">
                 <a:tc>
@@ -8065,6 +8317,11 @@
                     </a:lnB>
                   </a:tcPr>
                 </a:tc>
+                <a:extLst>
+                  <a:ext uri="{0D108BD9-81ED-4DB2-BD59-A6C34878D82A}">
+                    <a16:rowId xmlns:a16="http://schemas.microsoft.com/office/drawing/2014/main" val="10019"/>
+                  </a:ext>
+                </a:extLst>
               </a:tr>
               <a:tr h="150519">
                 <a:tc>
@@ -8163,6 +8420,11 @@
                     </a:lnB>
                   </a:tcPr>
                 </a:tc>
+                <a:extLst>
+                  <a:ext uri="{0D108BD9-81ED-4DB2-BD59-A6C34878D82A}">
+                    <a16:rowId xmlns:a16="http://schemas.microsoft.com/office/drawing/2014/main" val="10020"/>
+                  </a:ext>
+                </a:extLst>
               </a:tr>
             </a:tbl>
           </a:graphicData>
@@ -8185,9 +8447,27 @@
             <a:tbl>
               <a:tblPr/>
               <a:tblGrid>
-                <a:gridCol w="609600"/>
-                <a:gridCol w="609600"/>
-                <a:gridCol w="609600"/>
+                <a:gridCol w="609600">
+                  <a:extLst>
+                    <a:ext uri="{9D8B030D-6E8A-4147-A177-3AD203B41FA5}">
+                      <a16:colId xmlns:a16="http://schemas.microsoft.com/office/drawing/2014/main" val="20000"/>
+                    </a:ext>
+                  </a:extLst>
+                </a:gridCol>
+                <a:gridCol w="609600">
+                  <a:extLst>
+                    <a:ext uri="{9D8B030D-6E8A-4147-A177-3AD203B41FA5}">
+                      <a16:colId xmlns:a16="http://schemas.microsoft.com/office/drawing/2014/main" val="20001"/>
+                    </a:ext>
+                  </a:extLst>
+                </a:gridCol>
+                <a:gridCol w="609600">
+                  <a:extLst>
+                    <a:ext uri="{9D8B030D-6E8A-4147-A177-3AD203B41FA5}">
+                      <a16:colId xmlns:a16="http://schemas.microsoft.com/office/drawing/2014/main" val="20002"/>
+                    </a:ext>
+                  </a:extLst>
+                </a:gridCol>
               </a:tblGrid>
               <a:tr h="200025">
                 <a:tc>
@@ -8286,6 +8566,11 @@
                     </a:lnB>
                   </a:tcPr>
                 </a:tc>
+                <a:extLst>
+                  <a:ext uri="{0D108BD9-81ED-4DB2-BD59-A6C34878D82A}">
+                    <a16:rowId xmlns:a16="http://schemas.microsoft.com/office/drawing/2014/main" val="10000"/>
+                  </a:ext>
+                </a:extLst>
               </a:tr>
               <a:tr h="200025">
                 <a:tc>
@@ -8384,6 +8669,11 @@
                     </a:lnB>
                   </a:tcPr>
                 </a:tc>
+                <a:extLst>
+                  <a:ext uri="{0D108BD9-81ED-4DB2-BD59-A6C34878D82A}">
+                    <a16:rowId xmlns:a16="http://schemas.microsoft.com/office/drawing/2014/main" val="10001"/>
+                  </a:ext>
+                </a:extLst>
               </a:tr>
               <a:tr h="200025">
                 <a:tc>
@@ -8482,6 +8772,11 @@
                     </a:lnB>
                   </a:tcPr>
                 </a:tc>
+                <a:extLst>
+                  <a:ext uri="{0D108BD9-81ED-4DB2-BD59-A6C34878D82A}">
+                    <a16:rowId xmlns:a16="http://schemas.microsoft.com/office/drawing/2014/main" val="10002"/>
+                  </a:ext>
+                </a:extLst>
               </a:tr>
               <a:tr h="200025">
                 <a:tc>
@@ -8580,6 +8875,11 @@
                     </a:lnB>
                   </a:tcPr>
                 </a:tc>
+                <a:extLst>
+                  <a:ext uri="{0D108BD9-81ED-4DB2-BD59-A6C34878D82A}">
+                    <a16:rowId xmlns:a16="http://schemas.microsoft.com/office/drawing/2014/main" val="10003"/>
+                  </a:ext>
+                </a:extLst>
               </a:tr>
               <a:tr h="200025">
                 <a:tc>
@@ -8678,6 +8978,11 @@
                     </a:lnB>
                   </a:tcPr>
                 </a:tc>
+                <a:extLst>
+                  <a:ext uri="{0D108BD9-81ED-4DB2-BD59-A6C34878D82A}">
+                    <a16:rowId xmlns:a16="http://schemas.microsoft.com/office/drawing/2014/main" val="10004"/>
+                  </a:ext>
+                </a:extLst>
               </a:tr>
               <a:tr h="200025">
                 <a:tc>
@@ -8776,6 +9081,11 @@
                     </a:lnB>
                   </a:tcPr>
                 </a:tc>
+                <a:extLst>
+                  <a:ext uri="{0D108BD9-81ED-4DB2-BD59-A6C34878D82A}">
+                    <a16:rowId xmlns:a16="http://schemas.microsoft.com/office/drawing/2014/main" val="10005"/>
+                  </a:ext>
+                </a:extLst>
               </a:tr>
               <a:tr h="200025">
                 <a:tc>
@@ -8874,6 +9184,11 @@
                     </a:lnB>
                   </a:tcPr>
                 </a:tc>
+                <a:extLst>
+                  <a:ext uri="{0D108BD9-81ED-4DB2-BD59-A6C34878D82A}">
+                    <a16:rowId xmlns:a16="http://schemas.microsoft.com/office/drawing/2014/main" val="10006"/>
+                  </a:ext>
+                </a:extLst>
               </a:tr>
               <a:tr h="200025">
                 <a:tc>
@@ -8972,6 +9287,11 @@
                     </a:lnB>
                   </a:tcPr>
                 </a:tc>
+                <a:extLst>
+                  <a:ext uri="{0D108BD9-81ED-4DB2-BD59-A6C34878D82A}">
+                    <a16:rowId xmlns:a16="http://schemas.microsoft.com/office/drawing/2014/main" val="10007"/>
+                  </a:ext>
+                </a:extLst>
               </a:tr>
               <a:tr h="200025">
                 <a:tc>
@@ -9070,6 +9390,11 @@
                     </a:lnB>
                   </a:tcPr>
                 </a:tc>
+                <a:extLst>
+                  <a:ext uri="{0D108BD9-81ED-4DB2-BD59-A6C34878D82A}">
+                    <a16:rowId xmlns:a16="http://schemas.microsoft.com/office/drawing/2014/main" val="10008"/>
+                  </a:ext>
+                </a:extLst>
               </a:tr>
               <a:tr h="200025">
                 <a:tc>
@@ -9168,6 +9493,11 @@
                     </a:lnB>
                   </a:tcPr>
                 </a:tc>
+                <a:extLst>
+                  <a:ext uri="{0D108BD9-81ED-4DB2-BD59-A6C34878D82A}">
+                    <a16:rowId xmlns:a16="http://schemas.microsoft.com/office/drawing/2014/main" val="10009"/>
+                  </a:ext>
+                </a:extLst>
               </a:tr>
               <a:tr h="200025">
                 <a:tc>
@@ -9266,6 +9596,11 @@
                     </a:lnB>
                   </a:tcPr>
                 </a:tc>
+                <a:extLst>
+                  <a:ext uri="{0D108BD9-81ED-4DB2-BD59-A6C34878D82A}">
+                    <a16:rowId xmlns:a16="http://schemas.microsoft.com/office/drawing/2014/main" val="10010"/>
+                  </a:ext>
+                </a:extLst>
               </a:tr>
               <a:tr h="200025">
                 <a:tc>
@@ -9364,6 +9699,11 @@
                     </a:lnB>
                   </a:tcPr>
                 </a:tc>
+                <a:extLst>
+                  <a:ext uri="{0D108BD9-81ED-4DB2-BD59-A6C34878D82A}">
+                    <a16:rowId xmlns:a16="http://schemas.microsoft.com/office/drawing/2014/main" val="10011"/>
+                  </a:ext>
+                </a:extLst>
               </a:tr>
             </a:tbl>
           </a:graphicData>
@@ -9416,7 +9756,7 @@
           <a:p>
             <a:pPr eaLnBrk="1" hangingPunct="1"/>
             <a:r>
-              <a:rPr lang="es-UY" altLang="en-US" sz="2400" dirty="0" err="1" smtClean="0">
+              <a:rPr lang="es-UY" altLang="en-US" sz="2400" dirty="0" err="1">
                 <a:solidFill>
                   <a:schemeClr val="tx1"/>
                 </a:solidFill>
@@ -9425,7 +9765,7 @@
               <a:t>First</a:t>
             </a:r>
             <a:r>
-              <a:rPr lang="es-UY" altLang="en-US" sz="2400" dirty="0" smtClean="0">
+              <a:rPr lang="es-UY" altLang="en-US" sz="2400" dirty="0">
                 <a:solidFill>
                   <a:schemeClr val="tx1"/>
                 </a:solidFill>
@@ -9434,7 +9774,7 @@
               <a:t> and </a:t>
             </a:r>
             <a:r>
-              <a:rPr lang="es-UY" altLang="en-US" sz="2400" dirty="0" err="1" smtClean="0">
+              <a:rPr lang="es-UY" altLang="en-US" sz="2400" dirty="0" err="1">
                 <a:solidFill>
                   <a:schemeClr val="tx1"/>
                 </a:solidFill>
@@ -9443,7 +9783,7 @@
               <a:t>Last</a:t>
             </a:r>
             <a:r>
-              <a:rPr lang="es-UY" altLang="en-US" sz="2400" dirty="0" smtClean="0">
+              <a:rPr lang="es-UY" altLang="en-US" sz="2400" dirty="0">
                 <a:solidFill>
                   <a:schemeClr val="tx1"/>
                 </a:solidFill>
@@ -9452,7 +9792,7 @@
               <a:t> </a:t>
             </a:r>
             <a:r>
-              <a:rPr lang="es-UY" altLang="en-US" sz="2400" dirty="0" err="1" smtClean="0">
+              <a:rPr lang="es-UY" altLang="en-US" sz="2400" dirty="0" err="1">
                 <a:solidFill>
                   <a:schemeClr val="tx1"/>
                 </a:solidFill>
@@ -9461,7 +9801,7 @@
               <a:t>Observations</a:t>
             </a:r>
             <a:r>
-              <a:rPr lang="es-UY" altLang="en-US" sz="2400" dirty="0" smtClean="0">
+              <a:rPr lang="es-UY" altLang="en-US" sz="2400" dirty="0">
                 <a:solidFill>
                   <a:schemeClr val="tx1"/>
                 </a:solidFill>
@@ -9470,7 +9810,7 @@
               <a:t> </a:t>
             </a:r>
             <a:r>
-              <a:rPr lang="es-UY" altLang="en-US" sz="2400" dirty="0" err="1" smtClean="0">
+              <a:rPr lang="es-UY" altLang="en-US" sz="2400" dirty="0" err="1">
                 <a:solidFill>
                   <a:schemeClr val="tx1"/>
                 </a:solidFill>
@@ -9479,7 +9819,7 @@
               <a:t>from</a:t>
             </a:r>
             <a:r>
-              <a:rPr lang="es-UY" altLang="en-US" sz="2400" dirty="0" smtClean="0">
+              <a:rPr lang="es-UY" altLang="en-US" sz="2400" dirty="0">
                 <a:solidFill>
                   <a:schemeClr val="tx1"/>
                 </a:solidFill>
@@ -9488,7 +9828,7 @@
               <a:t> </a:t>
             </a:r>
             <a:r>
-              <a:rPr lang="es-UY" altLang="en-US" sz="2400" dirty="0" err="1" smtClean="0">
+              <a:rPr lang="es-UY" altLang="en-US" sz="2400" dirty="0" err="1">
                 <a:solidFill>
                   <a:schemeClr val="tx1"/>
                 </a:solidFill>
@@ -9496,7 +9836,7 @@
               </a:rPr>
               <a:t>dataset</a:t>
             </a:r>
-            <a:endParaRPr lang="es-ES" altLang="en-US" sz="2400" dirty="0" smtClean="0">
+            <a:endParaRPr lang="es-ES" altLang="en-US" sz="2400" dirty="0">
               <a:solidFill>
                 <a:schemeClr val="tx1"/>
               </a:solidFill>
@@ -9529,7 +9869,7 @@
               <a:buFontTx/>
               <a:buNone/>
             </a:pPr>
-            <a:endParaRPr lang="es-ES" altLang="en-US" smtClean="0"/>
+            <a:endParaRPr lang="es-ES" altLang="en-US"/>
           </a:p>
         </p:txBody>
       </p:sp>
@@ -9644,7 +9984,7 @@
           <a:p>
             <a:pPr eaLnBrk="1" hangingPunct="1"/>
             <a:r>
-              <a:rPr lang="en-US" altLang="en-US" sz="2400" dirty="0" smtClean="0">
+              <a:rPr lang="en-US" altLang="en-US" sz="2400" dirty="0">
                 <a:latin typeface="Arial Rounded MT Bold" pitchFamily="34" charset="0"/>
               </a:rPr>
               <a:t>Median alcohol content for each state</a:t>
@@ -9654,34 +9994,32 @@
       </p:sp>
       <p:pic>
         <p:nvPicPr>
-          <p:cNvPr id="16387" name="Picture 4"/>
+          <p:cNvPr id="3" name="Picture 2">
+            <a:extLst>
+              <a:ext uri="{FF2B5EF4-FFF2-40B4-BE49-F238E27FC236}">
+                <a16:creationId xmlns:a16="http://schemas.microsoft.com/office/drawing/2014/main" id="{D551E0CC-7CC5-014C-8342-554446CAF0D4}"/>
+              </a:ext>
+            </a:extLst>
+          </p:cNvPr>
           <p:cNvPicPr>
-            <a:picLocks noChangeAspect="1" noChangeArrowheads="1"/>
+            <a:picLocks noChangeAspect="1"/>
           </p:cNvPicPr>
           <p:nvPr/>
         </p:nvPicPr>
         <p:blipFill>
           <a:blip r:embed="rId2"/>
-          <a:srcRect/>
           <a:stretch>
             <a:fillRect/>
           </a:stretch>
         </p:blipFill>
-        <p:spPr bwMode="auto">
+        <p:spPr>
           <a:xfrm>
-            <a:off x="1656208" y="980728"/>
-            <a:ext cx="7380288" cy="5113337"/>
+            <a:off x="1691680" y="1628800"/>
+            <a:ext cx="6846912" cy="4833748"/>
           </a:xfrm>
           <a:prstGeom prst="rect">
             <a:avLst/>
           </a:prstGeom>
-          <a:noFill/>
-          <a:ln w="9525">
-            <a:noFill/>
-            <a:miter lim="800000"/>
-            <a:headEnd/>
-            <a:tailEnd/>
-          </a:ln>
         </p:spPr>
       </p:pic>
     </p:spTree>
@@ -9731,12 +10069,12 @@
           <a:p>
             <a:pPr eaLnBrk="1" hangingPunct="1"/>
             <a:r>
-              <a:rPr lang="en-US" altLang="en-US" sz="3600" dirty="0" smtClean="0">
+              <a:rPr lang="en-US" altLang="en-US" sz="3600" dirty="0">
                 <a:latin typeface="Arial Rounded MT Bold" pitchFamily="34" charset="0"/>
               </a:rPr>
               <a:t>Summary statistics of the ABV</a:t>
             </a:r>
-            <a:endParaRPr lang="es-ES" altLang="en-US" sz="3600" dirty="0" smtClean="0">
+            <a:endParaRPr lang="es-ES" altLang="en-US" sz="3600" dirty="0">
               <a:solidFill>
                 <a:schemeClr val="tx1"/>
               </a:solidFill>
@@ -9796,8 +10134,20 @@
                 <a:tableStyleId>{5C22544A-7EE6-4342-B048-85BDC9FD1C3A}</a:tableStyleId>
               </a:tblPr>
               <a:tblGrid>
-                <a:gridCol w="1572728"/>
-                <a:gridCol w="1523616"/>
+                <a:gridCol w="1572728">
+                  <a:extLst>
+                    <a:ext uri="{9D8B030D-6E8A-4147-A177-3AD203B41FA5}">
+                      <a16:colId xmlns:a16="http://schemas.microsoft.com/office/drawing/2014/main" val="20000"/>
+                    </a:ext>
+                  </a:extLst>
+                </a:gridCol>
+                <a:gridCol w="1523616">
+                  <a:extLst>
+                    <a:ext uri="{9D8B030D-6E8A-4147-A177-3AD203B41FA5}">
+                      <a16:colId xmlns:a16="http://schemas.microsoft.com/office/drawing/2014/main" val="20001"/>
+                    </a:ext>
+                  </a:extLst>
+                </a:gridCol>
               </a:tblGrid>
               <a:tr h="370840">
                 <a:tc>
@@ -9810,7 +10160,7 @@
                         <a:buNone/>
                       </a:pPr>
                       <a:r>
-                        <a:rPr lang="es-ES" altLang="en-US" sz="1800" dirty="0" err="1" smtClean="0">
+                        <a:rPr lang="es-ES" altLang="en-US" sz="1800" dirty="0" err="1">
                           <a:solidFill>
                             <a:schemeClr val="accent1">
                               <a:lumMod val="50000"/>
@@ -9837,7 +10187,7 @@
                     <a:p>
                       <a:pPr algn="ctr"/>
                       <a:r>
-                        <a:rPr lang="en-US" dirty="0" smtClean="0">
+                        <a:rPr lang="en-US" dirty="0">
                           <a:solidFill>
                             <a:schemeClr val="accent1">
                               <a:lumMod val="50000"/>
@@ -9846,17 +10196,15 @@
                         </a:rPr>
                         <a:t>Percentage</a:t>
                       </a:r>
-                      <a:endParaRPr lang="en-US" dirty="0">
-                        <a:solidFill>
-                          <a:schemeClr val="accent1">
-                            <a:lumMod val="50000"/>
-                          </a:schemeClr>
-                        </a:solidFill>
-                      </a:endParaRPr>
                     </a:p>
                   </a:txBody>
                   <a:tcPr/>
                 </a:tc>
+                <a:extLst>
+                  <a:ext uri="{0D108BD9-81ED-4DB2-BD59-A6C34878D82A}">
+                    <a16:rowId xmlns:a16="http://schemas.microsoft.com/office/drawing/2014/main" val="10000"/>
+                  </a:ext>
+                </a:extLst>
               </a:tr>
               <a:tr h="370840">
                 <a:tc>
@@ -9866,10 +10214,9 @@
                     <a:p>
                       <a:pPr algn="r"/>
                       <a:r>
-                        <a:rPr lang="en-US" dirty="0" smtClean="0"/>
+                        <a:rPr lang="en-US" dirty="0"/>
                         <a:t>Minimum</a:t>
                       </a:r>
-                      <a:endParaRPr lang="en-US" dirty="0"/>
                     </a:p>
                   </a:txBody>
                   <a:tcPr/>
@@ -9881,14 +10228,18 @@
                     <a:p>
                       <a:pPr algn="ctr"/>
                       <a:r>
-                        <a:rPr lang="en-US" dirty="0" smtClean="0"/>
+                        <a:rPr lang="en-US" dirty="0"/>
                         <a:t>.1%</a:t>
                       </a:r>
-                      <a:endParaRPr lang="en-US" dirty="0"/>
                     </a:p>
                   </a:txBody>
                   <a:tcPr/>
                 </a:tc>
+                <a:extLst>
+                  <a:ext uri="{0D108BD9-81ED-4DB2-BD59-A6C34878D82A}">
+                    <a16:rowId xmlns:a16="http://schemas.microsoft.com/office/drawing/2014/main" val="10001"/>
+                  </a:ext>
+                </a:extLst>
               </a:tr>
               <a:tr h="370840">
                 <a:tc>
@@ -9898,18 +10249,17 @@
                     <a:p>
                       <a:pPr algn="r"/>
                       <a:r>
-                        <a:rPr lang="en-US" dirty="0" smtClean="0"/>
+                        <a:rPr lang="en-US" dirty="0"/>
                         <a:t>1</a:t>
                       </a:r>
                       <a:r>
-                        <a:rPr lang="en-US" baseline="30000" dirty="0" smtClean="0"/>
+                        <a:rPr lang="en-US" baseline="30000" dirty="0"/>
                         <a:t>st</a:t>
                       </a:r>
                       <a:r>
-                        <a:rPr lang="en-US" dirty="0" smtClean="0"/>
+                        <a:rPr lang="en-US" dirty="0"/>
                         <a:t> Quartile</a:t>
                       </a:r>
-                      <a:endParaRPr lang="en-US" dirty="0"/>
                     </a:p>
                   </a:txBody>
                   <a:tcPr/>
@@ -9921,14 +10271,18 @@
                     <a:p>
                       <a:pPr algn="ctr"/>
                       <a:r>
-                        <a:rPr lang="en-US" dirty="0" smtClean="0"/>
+                        <a:rPr lang="en-US" dirty="0"/>
                         <a:t>5%</a:t>
                       </a:r>
-                      <a:endParaRPr lang="en-US" dirty="0"/>
                     </a:p>
                   </a:txBody>
                   <a:tcPr/>
                 </a:tc>
+                <a:extLst>
+                  <a:ext uri="{0D108BD9-81ED-4DB2-BD59-A6C34878D82A}">
+                    <a16:rowId xmlns:a16="http://schemas.microsoft.com/office/drawing/2014/main" val="10002"/>
+                  </a:ext>
+                </a:extLst>
               </a:tr>
               <a:tr h="370840">
                 <a:tc>
@@ -9938,10 +10292,9 @@
                     <a:p>
                       <a:pPr algn="r"/>
                       <a:r>
-                        <a:rPr lang="en-US" dirty="0" smtClean="0"/>
+                        <a:rPr lang="en-US" dirty="0"/>
                         <a:t>Median</a:t>
                       </a:r>
-                      <a:endParaRPr lang="en-US" dirty="0"/>
                     </a:p>
                   </a:txBody>
                   <a:tcPr/>
@@ -9953,14 +10306,18 @@
                     <a:p>
                       <a:pPr algn="ctr"/>
                       <a:r>
-                        <a:rPr lang="en-US" dirty="0" smtClean="0"/>
+                        <a:rPr lang="en-US" dirty="0"/>
                         <a:t>5.6%</a:t>
                       </a:r>
-                      <a:endParaRPr lang="en-US" dirty="0"/>
                     </a:p>
                   </a:txBody>
                   <a:tcPr/>
                 </a:tc>
+                <a:extLst>
+                  <a:ext uri="{0D108BD9-81ED-4DB2-BD59-A6C34878D82A}">
+                    <a16:rowId xmlns:a16="http://schemas.microsoft.com/office/drawing/2014/main" val="10003"/>
+                  </a:ext>
+                </a:extLst>
               </a:tr>
               <a:tr h="370840">
                 <a:tc>
@@ -9970,10 +10327,9 @@
                     <a:p>
                       <a:pPr algn="r"/>
                       <a:r>
-                        <a:rPr lang="en-US" dirty="0" smtClean="0"/>
+                        <a:rPr lang="en-US" dirty="0"/>
                         <a:t>Mean</a:t>
                       </a:r>
-                      <a:endParaRPr lang="en-US" dirty="0"/>
                     </a:p>
                   </a:txBody>
                   <a:tcPr/>
@@ -9985,14 +10341,18 @@
                     <a:p>
                       <a:pPr algn="ctr"/>
                       <a:r>
-                        <a:rPr lang="en-US" dirty="0" smtClean="0"/>
+                        <a:rPr lang="en-US" dirty="0"/>
                         <a:t>6.0%</a:t>
                       </a:r>
-                      <a:endParaRPr lang="en-US" dirty="0"/>
                     </a:p>
                   </a:txBody>
                   <a:tcPr/>
                 </a:tc>
+                <a:extLst>
+                  <a:ext uri="{0D108BD9-81ED-4DB2-BD59-A6C34878D82A}">
+                    <a16:rowId xmlns:a16="http://schemas.microsoft.com/office/drawing/2014/main" val="10004"/>
+                  </a:ext>
+                </a:extLst>
               </a:tr>
               <a:tr h="370840">
                 <a:tc>
@@ -10002,18 +10362,17 @@
                     <a:p>
                       <a:pPr algn="r"/>
                       <a:r>
-                        <a:rPr lang="en-US" dirty="0" smtClean="0"/>
+                        <a:rPr lang="en-US" dirty="0"/>
                         <a:t>3</a:t>
                       </a:r>
                       <a:r>
-                        <a:rPr lang="en-US" baseline="30000" dirty="0" smtClean="0"/>
+                        <a:rPr lang="en-US" baseline="30000" dirty="0"/>
                         <a:t>rd</a:t>
                       </a:r>
                       <a:r>
-                        <a:rPr lang="en-US" dirty="0" smtClean="0"/>
+                        <a:rPr lang="en-US" dirty="0"/>
                         <a:t> Quartile</a:t>
                       </a:r>
-                      <a:endParaRPr lang="en-US" dirty="0"/>
                     </a:p>
                   </a:txBody>
                   <a:tcPr/>
@@ -10025,14 +10384,18 @@
                     <a:p>
                       <a:pPr algn="ctr"/>
                       <a:r>
-                        <a:rPr lang="en-US" dirty="0" smtClean="0"/>
+                        <a:rPr lang="en-US" dirty="0"/>
                         <a:t>6.7%</a:t>
                       </a:r>
-                      <a:endParaRPr lang="en-US" dirty="0"/>
                     </a:p>
                   </a:txBody>
                   <a:tcPr/>
                 </a:tc>
+                <a:extLst>
+                  <a:ext uri="{0D108BD9-81ED-4DB2-BD59-A6C34878D82A}">
+                    <a16:rowId xmlns:a16="http://schemas.microsoft.com/office/drawing/2014/main" val="10005"/>
+                  </a:ext>
+                </a:extLst>
               </a:tr>
               <a:tr h="370840">
                 <a:tc>
@@ -10042,10 +10405,9 @@
                     <a:p>
                       <a:pPr algn="r"/>
                       <a:r>
-                        <a:rPr lang="en-US" dirty="0" smtClean="0"/>
+                        <a:rPr lang="en-US" dirty="0"/>
                         <a:t>Maximum</a:t>
                       </a:r>
-                      <a:endParaRPr lang="en-US" dirty="0"/>
                     </a:p>
                   </a:txBody>
                   <a:tcPr/>
@@ -10057,14 +10419,18 @@
                     <a:p>
                       <a:pPr algn="ctr"/>
                       <a:r>
-                        <a:rPr lang="en-US" dirty="0" smtClean="0"/>
+                        <a:rPr lang="en-US" dirty="0"/>
                         <a:t>12.8%</a:t>
                       </a:r>
-                      <a:endParaRPr lang="en-US" dirty="0"/>
                     </a:p>
                   </a:txBody>
                   <a:tcPr/>
                 </a:tc>
+                <a:extLst>
+                  <a:ext uri="{0D108BD9-81ED-4DB2-BD59-A6C34878D82A}">
+                    <a16:rowId xmlns:a16="http://schemas.microsoft.com/office/drawing/2014/main" val="10006"/>
+                  </a:ext>
+                </a:extLst>
               </a:tr>
             </a:tbl>
           </a:graphicData>
@@ -10095,38 +10461,6 @@
           <a:chExt cx="0" cy="0"/>
         </a:xfrm>
       </p:grpSpPr>
-      <p:pic>
-        <p:nvPicPr>
-          <p:cNvPr id="17411" name="Picture 4"/>
-          <p:cNvPicPr>
-            <a:picLocks noChangeAspect="1" noChangeArrowheads="1"/>
-          </p:cNvPicPr>
-          <p:nvPr/>
-        </p:nvPicPr>
-        <p:blipFill>
-          <a:blip r:embed="rId2"/>
-          <a:srcRect/>
-          <a:stretch>
-            <a:fillRect/>
-          </a:stretch>
-        </p:blipFill>
-        <p:spPr bwMode="auto">
-          <a:xfrm>
-            <a:off x="1691680" y="980728"/>
-            <a:ext cx="7202487" cy="5126037"/>
-          </a:xfrm>
-          <a:prstGeom prst="rect">
-            <a:avLst/>
-          </a:prstGeom>
-          <a:noFill/>
-          <a:ln w="9525">
-            <a:noFill/>
-            <a:miter lim="800000"/>
-            <a:headEnd/>
-            <a:tailEnd/>
-          </a:ln>
-        </p:spPr>
-      </p:pic>
       <p:sp>
         <p:nvSpPr>
           <p:cNvPr id="5" name="Rectangle 2"/>
@@ -10178,7 +10512,7 @@
               <a:defRPr/>
             </a:pPr>
             <a:r>
-              <a:rPr kumimoji="0" lang="en-US" altLang="en-US" sz="2400" b="0" i="0" u="none" strike="noStrike" kern="1200" cap="none" spc="0" normalizeH="0" baseline="0" noProof="0" dirty="0" smtClean="0">
+              <a:rPr kumimoji="0" lang="en-US" altLang="en-US" sz="2400" b="0" i="0" u="none" strike="noStrike" kern="1200" cap="none" spc="0" normalizeH="0" baseline="0" noProof="0" dirty="0">
                 <a:ln>
                   <a:noFill/>
                 </a:ln>
@@ -10197,6 +10531,36 @@
           </a:p>
         </p:txBody>
       </p:sp>
+      <p:pic>
+        <p:nvPicPr>
+          <p:cNvPr id="3" name="Picture 2">
+            <a:extLst>
+              <a:ext uri="{FF2B5EF4-FFF2-40B4-BE49-F238E27FC236}">
+                <a16:creationId xmlns:a16="http://schemas.microsoft.com/office/drawing/2014/main" id="{85D6014E-992E-994F-9DF6-EABD0AF2A8AA}"/>
+              </a:ext>
+            </a:extLst>
+          </p:cNvPr>
+          <p:cNvPicPr>
+            <a:picLocks noChangeAspect="1"/>
+          </p:cNvPicPr>
+          <p:nvPr/>
+        </p:nvPicPr>
+        <p:blipFill>
+          <a:blip r:embed="rId2"/>
+          <a:stretch>
+            <a:fillRect/>
+          </a:stretch>
+        </p:blipFill>
+        <p:spPr>
+          <a:xfrm>
+            <a:off x="1763688" y="1124744"/>
+            <a:ext cx="6696744" cy="4831146"/>
+          </a:xfrm>
+          <a:prstGeom prst="rect">
+            <a:avLst/>
+          </a:prstGeom>
+        </p:spPr>
+      </p:pic>
     </p:spTree>
   </p:cSld>
   <p:clrMapOvr>
@@ -10244,12 +10608,12 @@
           <a:p>
             <a:pPr eaLnBrk="1" hangingPunct="1"/>
             <a:r>
-              <a:rPr lang="en-US" altLang="en-US" sz="3600" dirty="0" smtClean="0">
+              <a:rPr lang="en-US" altLang="en-US" sz="3600" dirty="0">
                 <a:latin typeface="Arial Rounded MT Bold" pitchFamily="34" charset="0"/>
               </a:rPr>
               <a:t>Extreme States</a:t>
             </a:r>
-            <a:endParaRPr lang="es-ES" altLang="en-US" sz="3600" dirty="0" smtClean="0">
+            <a:endParaRPr lang="es-ES" altLang="en-US" sz="3600" dirty="0">
               <a:solidFill>
                 <a:schemeClr val="tx1"/>
               </a:solidFill>
@@ -10283,15 +10647,15 @@
               <a:buNone/>
             </a:pPr>
             <a:r>
-              <a:rPr lang="es-ES" altLang="en-US" dirty="0" smtClean="0"/>
+              <a:rPr lang="es-ES" altLang="en-US" dirty="0"/>
               <a:t>Max ABV: </a:t>
             </a:r>
             <a:r>
-              <a:rPr lang="es-ES" altLang="en-US" dirty="0" err="1" smtClean="0"/>
+              <a:rPr lang="es-ES" altLang="en-US" dirty="0" err="1"/>
               <a:t>District</a:t>
             </a:r>
             <a:r>
-              <a:rPr lang="es-ES" altLang="en-US" dirty="0" smtClean="0"/>
+              <a:rPr lang="es-ES" altLang="en-US" dirty="0"/>
               <a:t> of Columbia</a:t>
             </a:r>
           </a:p>
@@ -10300,7 +10664,7 @@
               <a:buFontTx/>
               <a:buNone/>
             </a:pPr>
-            <a:endParaRPr lang="es-ES" altLang="en-US" dirty="0" smtClean="0"/>
+            <a:endParaRPr lang="es-ES" altLang="en-US" dirty="0"/>
           </a:p>
           <a:p>
             <a:pPr marL="0" indent="0" eaLnBrk="1" hangingPunct="1">
@@ -10308,7 +10672,7 @@
               <a:buNone/>
             </a:pPr>
             <a:r>
-              <a:rPr lang="es-ES" altLang="en-US" dirty="0" smtClean="0"/>
+              <a:rPr lang="es-ES" altLang="en-US" dirty="0"/>
               <a:t>Max IBU: Maine</a:t>
             </a:r>
           </a:p>
@@ -10361,12 +10725,12 @@
           <a:p>
             <a:pPr eaLnBrk="1" hangingPunct="1"/>
             <a:r>
-              <a:rPr lang="en-US" altLang="en-US" sz="3600" dirty="0" smtClean="0">
+              <a:rPr lang="en-US" altLang="en-US" sz="3600" dirty="0">
                 <a:latin typeface="Arial Rounded MT Bold" pitchFamily="34" charset="0"/>
               </a:rPr>
               <a:t>ABV vs. IBU correlation</a:t>
             </a:r>
-            <a:endParaRPr lang="es-ES" altLang="en-US" sz="3600" dirty="0" smtClean="0">
+            <a:endParaRPr lang="es-ES" altLang="en-US" sz="3600" dirty="0">
               <a:solidFill>
                 <a:schemeClr val="tx1"/>
               </a:solidFill>
@@ -11103,7 +11467,7 @@
   </a:extraClrSchemeLst>
   <a:extLst>
     <a:ext uri="{05A4C25C-085E-4340-85A3-A5531E510DB2}">
-      <thm15:themeFamily xmlns:thm15="http://schemas.microsoft.com/office/thememl/2012/main" xmlns="" name="Office Theme" id="{62F939B6-93AF-4DB8-9C6B-D6C7DFDC589F}" vid="{4A3C46E8-61CC-4603-A589-7422A47A8E4A}"/>
+      <thm15:themeFamily xmlns:thm15="http://schemas.microsoft.com/office/thememl/2012/main" name="Office Theme" id="{62F939B6-93AF-4DB8-9C6B-D6C7DFDC589F}" vid="{4A3C46E8-61CC-4603-A589-7422A47A8E4A}"/>
     </a:ext>
   </a:extLst>
 </a:theme>

</xml_diff>